<commit_message>
final presentation for the video
</commit_message>
<xml_diff>
--- a/FinalPresentationSlides/FinalPresentationGeneric.pptx
+++ b/FinalPresentationSlides/FinalPresentationGeneric.pptx
@@ -131,7 +131,7 @@
   </p:defaultTextStyle>
   <p:extLst>
     <p:ext uri="{EFAFB233-063F-42B5-8137-9DF3F51BA10A}">
-      <p15:sldGuideLst xmlns:p15="http://schemas.microsoft.com/office/powerpoint/2012/main"/>
+      <p15:sldGuideLst xmlns:p15="http://schemas.microsoft.com/office/powerpoint/2012/main" xmlns=""/>
     </p:ext>
   </p:extLst>
 </p:presentation>
@@ -219,7 +219,7 @@
           <a:p>
             <a:fld id="{87857EF3-CB16-4D9F-BA52-FAE19D95CBEC}" type="datetimeFigureOut">
               <a:rPr lang="en-US" smtClean="0"/>
-              <a:t>4/24/2015</a:t>
+              <a:t>4/24/15</a:t>
             </a:fld>
             <a:endParaRPr lang="en-US"/>
           </a:p>
@@ -571,6 +571,846 @@
 </p:notes>
 </file>
 
+<file path=ppt/notesSlides/notesSlide10.xml><?xml version="1.0" encoding="utf-8"?>
+<p:notes xmlns:a="http://schemas.openxmlformats.org/drawingml/2006/main" xmlns:r="http://schemas.openxmlformats.org/officeDocument/2006/relationships" xmlns:p="http://schemas.openxmlformats.org/presentationml/2006/main">
+  <p:cSld>
+    <p:spTree>
+      <p:nvGrpSpPr>
+        <p:cNvPr id="1" name=""/>
+        <p:cNvGrpSpPr/>
+        <p:nvPr/>
+      </p:nvGrpSpPr>
+      <p:grpSpPr>
+        <a:xfrm>
+          <a:off x="0" y="0"/>
+          <a:ext cx="0" cy="0"/>
+          <a:chOff x="0" y="0"/>
+          <a:chExt cx="0" cy="0"/>
+        </a:xfrm>
+      </p:grpSpPr>
+      <p:sp>
+        <p:nvSpPr>
+          <p:cNvPr id="2" name="Slide Image Placeholder 1"/>
+          <p:cNvSpPr>
+            <a:spLocks noGrp="1" noRot="1" noChangeAspect="1"/>
+          </p:cNvSpPr>
+          <p:nvPr>
+            <p:ph type="sldImg"/>
+          </p:nvPr>
+        </p:nvSpPr>
+        <p:spPr/>
+      </p:sp>
+      <p:sp>
+        <p:nvSpPr>
+          <p:cNvPr id="3" name="Notes Placeholder 2"/>
+          <p:cNvSpPr>
+            <a:spLocks noGrp="1"/>
+          </p:cNvSpPr>
+          <p:nvPr>
+            <p:ph type="body" idx="1"/>
+          </p:nvPr>
+        </p:nvSpPr>
+        <p:spPr/>
+        <p:txBody>
+          <a:bodyPr/>
+          <a:lstStyle/>
+          <a:p>
+            <a:endParaRPr lang="en-US"/>
+          </a:p>
+        </p:txBody>
+      </p:sp>
+      <p:sp>
+        <p:nvSpPr>
+          <p:cNvPr id="4" name="Slide Number Placeholder 3"/>
+          <p:cNvSpPr>
+            <a:spLocks noGrp="1"/>
+          </p:cNvSpPr>
+          <p:nvPr>
+            <p:ph type="sldNum" sz="quarter" idx="10"/>
+          </p:nvPr>
+        </p:nvSpPr>
+        <p:spPr/>
+        <p:txBody>
+          <a:bodyPr/>
+          <a:lstStyle/>
+          <a:p>
+            <a:fld id="{E7293BAF-A3DF-4D41-B4FC-78E3151B54AD}" type="slidenum">
+              <a:rPr lang="en-US" smtClean="0"/>
+              <a:t>10</a:t>
+            </a:fld>
+            <a:endParaRPr lang="en-US"/>
+          </a:p>
+        </p:txBody>
+      </p:sp>
+    </p:spTree>
+    <p:extLst>
+      <p:ext uri="{BB962C8B-B14F-4D97-AF65-F5344CB8AC3E}">
+        <p14:creationId xmlns:p14="http://schemas.microsoft.com/office/powerpoint/2010/main" val="4128878374"/>
+      </p:ext>
+    </p:extLst>
+  </p:cSld>
+  <p:clrMapOvr>
+    <a:masterClrMapping/>
+  </p:clrMapOvr>
+</p:notes>
+</file>
+
+<file path=ppt/notesSlides/notesSlide11.xml><?xml version="1.0" encoding="utf-8"?>
+<p:notes xmlns:a="http://schemas.openxmlformats.org/drawingml/2006/main" xmlns:r="http://schemas.openxmlformats.org/officeDocument/2006/relationships" xmlns:p="http://schemas.openxmlformats.org/presentationml/2006/main">
+  <p:cSld>
+    <p:spTree>
+      <p:nvGrpSpPr>
+        <p:cNvPr id="1" name=""/>
+        <p:cNvGrpSpPr/>
+        <p:nvPr/>
+      </p:nvGrpSpPr>
+      <p:grpSpPr>
+        <a:xfrm>
+          <a:off x="0" y="0"/>
+          <a:ext cx="0" cy="0"/>
+          <a:chOff x="0" y="0"/>
+          <a:chExt cx="0" cy="0"/>
+        </a:xfrm>
+      </p:grpSpPr>
+      <p:sp>
+        <p:nvSpPr>
+          <p:cNvPr id="2" name="Slide Image Placeholder 1"/>
+          <p:cNvSpPr>
+            <a:spLocks noGrp="1" noRot="1" noChangeAspect="1"/>
+          </p:cNvSpPr>
+          <p:nvPr>
+            <p:ph type="sldImg"/>
+          </p:nvPr>
+        </p:nvSpPr>
+        <p:spPr/>
+      </p:sp>
+      <p:sp>
+        <p:nvSpPr>
+          <p:cNvPr id="3" name="Notes Placeholder 2"/>
+          <p:cNvSpPr>
+            <a:spLocks noGrp="1"/>
+          </p:cNvSpPr>
+          <p:nvPr>
+            <p:ph type="body" idx="1"/>
+          </p:nvPr>
+        </p:nvSpPr>
+        <p:spPr/>
+        <p:txBody>
+          <a:bodyPr/>
+          <a:lstStyle/>
+          <a:p>
+            <a:endParaRPr lang="en-US"/>
+          </a:p>
+        </p:txBody>
+      </p:sp>
+      <p:sp>
+        <p:nvSpPr>
+          <p:cNvPr id="4" name="Slide Number Placeholder 3"/>
+          <p:cNvSpPr>
+            <a:spLocks noGrp="1"/>
+          </p:cNvSpPr>
+          <p:nvPr>
+            <p:ph type="sldNum" sz="quarter" idx="10"/>
+          </p:nvPr>
+        </p:nvSpPr>
+        <p:spPr/>
+        <p:txBody>
+          <a:bodyPr/>
+          <a:lstStyle/>
+          <a:p>
+            <a:fld id="{E7293BAF-A3DF-4D41-B4FC-78E3151B54AD}" type="slidenum">
+              <a:rPr lang="en-US" smtClean="0"/>
+              <a:t>11</a:t>
+            </a:fld>
+            <a:endParaRPr lang="en-US"/>
+          </a:p>
+        </p:txBody>
+      </p:sp>
+    </p:spTree>
+    <p:extLst>
+      <p:ext uri="{BB962C8B-B14F-4D97-AF65-F5344CB8AC3E}">
+        <p14:creationId xmlns:p14="http://schemas.microsoft.com/office/powerpoint/2010/main" val="4252044243"/>
+      </p:ext>
+    </p:extLst>
+  </p:cSld>
+  <p:clrMapOvr>
+    <a:masterClrMapping/>
+  </p:clrMapOvr>
+</p:notes>
+</file>
+
+<file path=ppt/notesSlides/notesSlide12.xml><?xml version="1.0" encoding="utf-8"?>
+<p:notes xmlns:a="http://schemas.openxmlformats.org/drawingml/2006/main" xmlns:r="http://schemas.openxmlformats.org/officeDocument/2006/relationships" xmlns:p="http://schemas.openxmlformats.org/presentationml/2006/main">
+  <p:cSld>
+    <p:spTree>
+      <p:nvGrpSpPr>
+        <p:cNvPr id="1" name=""/>
+        <p:cNvGrpSpPr/>
+        <p:nvPr/>
+      </p:nvGrpSpPr>
+      <p:grpSpPr>
+        <a:xfrm>
+          <a:off x="0" y="0"/>
+          <a:ext cx="0" cy="0"/>
+          <a:chOff x="0" y="0"/>
+          <a:chExt cx="0" cy="0"/>
+        </a:xfrm>
+      </p:grpSpPr>
+      <p:sp>
+        <p:nvSpPr>
+          <p:cNvPr id="2" name="Slide Image Placeholder 1"/>
+          <p:cNvSpPr>
+            <a:spLocks noGrp="1" noRot="1" noChangeAspect="1"/>
+          </p:cNvSpPr>
+          <p:nvPr>
+            <p:ph type="sldImg"/>
+          </p:nvPr>
+        </p:nvSpPr>
+        <p:spPr/>
+      </p:sp>
+      <p:sp>
+        <p:nvSpPr>
+          <p:cNvPr id="3" name="Notes Placeholder 2"/>
+          <p:cNvSpPr>
+            <a:spLocks noGrp="1"/>
+          </p:cNvSpPr>
+          <p:nvPr>
+            <p:ph type="body" idx="1"/>
+          </p:nvPr>
+        </p:nvSpPr>
+        <p:spPr/>
+        <p:txBody>
+          <a:bodyPr/>
+          <a:lstStyle/>
+          <a:p>
+            <a:endParaRPr lang="en-US"/>
+          </a:p>
+        </p:txBody>
+      </p:sp>
+      <p:sp>
+        <p:nvSpPr>
+          <p:cNvPr id="4" name="Slide Number Placeholder 3"/>
+          <p:cNvSpPr>
+            <a:spLocks noGrp="1"/>
+          </p:cNvSpPr>
+          <p:nvPr>
+            <p:ph type="sldNum" sz="quarter" idx="10"/>
+          </p:nvPr>
+        </p:nvSpPr>
+        <p:spPr/>
+        <p:txBody>
+          <a:bodyPr/>
+          <a:lstStyle/>
+          <a:p>
+            <a:fld id="{E7293BAF-A3DF-4D41-B4FC-78E3151B54AD}" type="slidenum">
+              <a:rPr lang="en-US" smtClean="0"/>
+              <a:t>12</a:t>
+            </a:fld>
+            <a:endParaRPr lang="en-US"/>
+          </a:p>
+        </p:txBody>
+      </p:sp>
+    </p:spTree>
+    <p:extLst>
+      <p:ext uri="{BB962C8B-B14F-4D97-AF65-F5344CB8AC3E}">
+        <p14:creationId xmlns:p14="http://schemas.microsoft.com/office/powerpoint/2010/main" val="1457490558"/>
+      </p:ext>
+    </p:extLst>
+  </p:cSld>
+  <p:clrMapOvr>
+    <a:masterClrMapping/>
+  </p:clrMapOvr>
+</p:notes>
+</file>
+
+<file path=ppt/notesSlides/notesSlide13.xml><?xml version="1.0" encoding="utf-8"?>
+<p:notes xmlns:a="http://schemas.openxmlformats.org/drawingml/2006/main" xmlns:r="http://schemas.openxmlformats.org/officeDocument/2006/relationships" xmlns:p="http://schemas.openxmlformats.org/presentationml/2006/main">
+  <p:cSld>
+    <p:spTree>
+      <p:nvGrpSpPr>
+        <p:cNvPr id="1" name=""/>
+        <p:cNvGrpSpPr/>
+        <p:nvPr/>
+      </p:nvGrpSpPr>
+      <p:grpSpPr>
+        <a:xfrm>
+          <a:off x="0" y="0"/>
+          <a:ext cx="0" cy="0"/>
+          <a:chOff x="0" y="0"/>
+          <a:chExt cx="0" cy="0"/>
+        </a:xfrm>
+      </p:grpSpPr>
+      <p:sp>
+        <p:nvSpPr>
+          <p:cNvPr id="2" name="Slide Image Placeholder 1"/>
+          <p:cNvSpPr>
+            <a:spLocks noGrp="1" noRot="1" noChangeAspect="1"/>
+          </p:cNvSpPr>
+          <p:nvPr>
+            <p:ph type="sldImg"/>
+          </p:nvPr>
+        </p:nvSpPr>
+        <p:spPr/>
+      </p:sp>
+      <p:sp>
+        <p:nvSpPr>
+          <p:cNvPr id="3" name="Notes Placeholder 2"/>
+          <p:cNvSpPr>
+            <a:spLocks noGrp="1"/>
+          </p:cNvSpPr>
+          <p:nvPr>
+            <p:ph type="body" idx="1"/>
+          </p:nvPr>
+        </p:nvSpPr>
+        <p:spPr/>
+        <p:txBody>
+          <a:bodyPr/>
+          <a:lstStyle/>
+          <a:p>
+            <a:endParaRPr lang="en-US"/>
+          </a:p>
+        </p:txBody>
+      </p:sp>
+      <p:sp>
+        <p:nvSpPr>
+          <p:cNvPr id="4" name="Slide Number Placeholder 3"/>
+          <p:cNvSpPr>
+            <a:spLocks noGrp="1"/>
+          </p:cNvSpPr>
+          <p:nvPr>
+            <p:ph type="sldNum" sz="quarter" idx="10"/>
+          </p:nvPr>
+        </p:nvSpPr>
+        <p:spPr/>
+        <p:txBody>
+          <a:bodyPr/>
+          <a:lstStyle/>
+          <a:p>
+            <a:fld id="{E7293BAF-A3DF-4D41-B4FC-78E3151B54AD}" type="slidenum">
+              <a:rPr lang="en-US" smtClean="0"/>
+              <a:t>13</a:t>
+            </a:fld>
+            <a:endParaRPr lang="en-US"/>
+          </a:p>
+        </p:txBody>
+      </p:sp>
+    </p:spTree>
+    <p:extLst>
+      <p:ext uri="{BB962C8B-B14F-4D97-AF65-F5344CB8AC3E}">
+        <p14:creationId xmlns:p14="http://schemas.microsoft.com/office/powerpoint/2010/main" val="1550592861"/>
+      </p:ext>
+    </p:extLst>
+  </p:cSld>
+  <p:clrMapOvr>
+    <a:masterClrMapping/>
+  </p:clrMapOvr>
+</p:notes>
+</file>
+
+<file path=ppt/notesSlides/notesSlide14.xml><?xml version="1.0" encoding="utf-8"?>
+<p:notes xmlns:a="http://schemas.openxmlformats.org/drawingml/2006/main" xmlns:r="http://schemas.openxmlformats.org/officeDocument/2006/relationships" xmlns:p="http://schemas.openxmlformats.org/presentationml/2006/main">
+  <p:cSld>
+    <p:spTree>
+      <p:nvGrpSpPr>
+        <p:cNvPr id="1" name=""/>
+        <p:cNvGrpSpPr/>
+        <p:nvPr/>
+      </p:nvGrpSpPr>
+      <p:grpSpPr>
+        <a:xfrm>
+          <a:off x="0" y="0"/>
+          <a:ext cx="0" cy="0"/>
+          <a:chOff x="0" y="0"/>
+          <a:chExt cx="0" cy="0"/>
+        </a:xfrm>
+      </p:grpSpPr>
+      <p:sp>
+        <p:nvSpPr>
+          <p:cNvPr id="2" name="Slide Image Placeholder 1"/>
+          <p:cNvSpPr>
+            <a:spLocks noGrp="1" noRot="1" noChangeAspect="1"/>
+          </p:cNvSpPr>
+          <p:nvPr>
+            <p:ph type="sldImg"/>
+          </p:nvPr>
+        </p:nvSpPr>
+        <p:spPr/>
+      </p:sp>
+      <p:sp>
+        <p:nvSpPr>
+          <p:cNvPr id="3" name="Notes Placeholder 2"/>
+          <p:cNvSpPr>
+            <a:spLocks noGrp="1"/>
+          </p:cNvSpPr>
+          <p:nvPr>
+            <p:ph type="body" idx="1"/>
+          </p:nvPr>
+        </p:nvSpPr>
+        <p:spPr/>
+        <p:txBody>
+          <a:bodyPr/>
+          <a:lstStyle/>
+          <a:p>
+            <a:endParaRPr lang="en-US"/>
+          </a:p>
+        </p:txBody>
+      </p:sp>
+      <p:sp>
+        <p:nvSpPr>
+          <p:cNvPr id="4" name="Slide Number Placeholder 3"/>
+          <p:cNvSpPr>
+            <a:spLocks noGrp="1"/>
+          </p:cNvSpPr>
+          <p:nvPr>
+            <p:ph type="sldNum" sz="quarter" idx="10"/>
+          </p:nvPr>
+        </p:nvSpPr>
+        <p:spPr/>
+        <p:txBody>
+          <a:bodyPr/>
+          <a:lstStyle/>
+          <a:p>
+            <a:fld id="{E7293BAF-A3DF-4D41-B4FC-78E3151B54AD}" type="slidenum">
+              <a:rPr lang="en-US" smtClean="0"/>
+              <a:t>14</a:t>
+            </a:fld>
+            <a:endParaRPr lang="en-US"/>
+          </a:p>
+        </p:txBody>
+      </p:sp>
+    </p:spTree>
+    <p:extLst>
+      <p:ext uri="{BB962C8B-B14F-4D97-AF65-F5344CB8AC3E}">
+        <p14:creationId xmlns:p14="http://schemas.microsoft.com/office/powerpoint/2010/main" val="2020937430"/>
+      </p:ext>
+    </p:extLst>
+  </p:cSld>
+  <p:clrMapOvr>
+    <a:masterClrMapping/>
+  </p:clrMapOvr>
+</p:notes>
+</file>
+
+<file path=ppt/notesSlides/notesSlide15.xml><?xml version="1.0" encoding="utf-8"?>
+<p:notes xmlns:a="http://schemas.openxmlformats.org/drawingml/2006/main" xmlns:r="http://schemas.openxmlformats.org/officeDocument/2006/relationships" xmlns:p="http://schemas.openxmlformats.org/presentationml/2006/main">
+  <p:cSld>
+    <p:spTree>
+      <p:nvGrpSpPr>
+        <p:cNvPr id="1" name=""/>
+        <p:cNvGrpSpPr/>
+        <p:nvPr/>
+      </p:nvGrpSpPr>
+      <p:grpSpPr>
+        <a:xfrm>
+          <a:off x="0" y="0"/>
+          <a:ext cx="0" cy="0"/>
+          <a:chOff x="0" y="0"/>
+          <a:chExt cx="0" cy="0"/>
+        </a:xfrm>
+      </p:grpSpPr>
+      <p:sp>
+        <p:nvSpPr>
+          <p:cNvPr id="2" name="Slide Image Placeholder 1"/>
+          <p:cNvSpPr>
+            <a:spLocks noGrp="1" noRot="1" noChangeAspect="1"/>
+          </p:cNvSpPr>
+          <p:nvPr>
+            <p:ph type="sldImg"/>
+          </p:nvPr>
+        </p:nvSpPr>
+        <p:spPr/>
+      </p:sp>
+      <p:sp>
+        <p:nvSpPr>
+          <p:cNvPr id="3" name="Notes Placeholder 2"/>
+          <p:cNvSpPr>
+            <a:spLocks noGrp="1"/>
+          </p:cNvSpPr>
+          <p:nvPr>
+            <p:ph type="body" idx="1"/>
+          </p:nvPr>
+        </p:nvSpPr>
+        <p:spPr/>
+        <p:txBody>
+          <a:bodyPr/>
+          <a:lstStyle/>
+          <a:p>
+            <a:endParaRPr lang="en-US"/>
+          </a:p>
+        </p:txBody>
+      </p:sp>
+      <p:sp>
+        <p:nvSpPr>
+          <p:cNvPr id="4" name="Slide Number Placeholder 3"/>
+          <p:cNvSpPr>
+            <a:spLocks noGrp="1"/>
+          </p:cNvSpPr>
+          <p:nvPr>
+            <p:ph type="sldNum" sz="quarter" idx="10"/>
+          </p:nvPr>
+        </p:nvSpPr>
+        <p:spPr/>
+        <p:txBody>
+          <a:bodyPr/>
+          <a:lstStyle/>
+          <a:p>
+            <a:fld id="{E7293BAF-A3DF-4D41-B4FC-78E3151B54AD}" type="slidenum">
+              <a:rPr lang="en-US" smtClean="0"/>
+              <a:t>15</a:t>
+            </a:fld>
+            <a:endParaRPr lang="en-US"/>
+          </a:p>
+        </p:txBody>
+      </p:sp>
+    </p:spTree>
+    <p:extLst>
+      <p:ext uri="{BB962C8B-B14F-4D97-AF65-F5344CB8AC3E}">
+        <p14:creationId xmlns:p14="http://schemas.microsoft.com/office/powerpoint/2010/main" val="197477246"/>
+      </p:ext>
+    </p:extLst>
+  </p:cSld>
+  <p:clrMapOvr>
+    <a:masterClrMapping/>
+  </p:clrMapOvr>
+</p:notes>
+</file>
+
+<file path=ppt/notesSlides/notesSlide16.xml><?xml version="1.0" encoding="utf-8"?>
+<p:notes xmlns:a="http://schemas.openxmlformats.org/drawingml/2006/main" xmlns:r="http://schemas.openxmlformats.org/officeDocument/2006/relationships" xmlns:p="http://schemas.openxmlformats.org/presentationml/2006/main">
+  <p:cSld>
+    <p:spTree>
+      <p:nvGrpSpPr>
+        <p:cNvPr id="1" name=""/>
+        <p:cNvGrpSpPr/>
+        <p:nvPr/>
+      </p:nvGrpSpPr>
+      <p:grpSpPr>
+        <a:xfrm>
+          <a:off x="0" y="0"/>
+          <a:ext cx="0" cy="0"/>
+          <a:chOff x="0" y="0"/>
+          <a:chExt cx="0" cy="0"/>
+        </a:xfrm>
+      </p:grpSpPr>
+      <p:sp>
+        <p:nvSpPr>
+          <p:cNvPr id="2" name="Slide Image Placeholder 1"/>
+          <p:cNvSpPr>
+            <a:spLocks noGrp="1" noRot="1" noChangeAspect="1"/>
+          </p:cNvSpPr>
+          <p:nvPr>
+            <p:ph type="sldImg"/>
+          </p:nvPr>
+        </p:nvSpPr>
+        <p:spPr/>
+      </p:sp>
+      <p:sp>
+        <p:nvSpPr>
+          <p:cNvPr id="3" name="Notes Placeholder 2"/>
+          <p:cNvSpPr>
+            <a:spLocks noGrp="1"/>
+          </p:cNvSpPr>
+          <p:nvPr>
+            <p:ph type="body" idx="1"/>
+          </p:nvPr>
+        </p:nvSpPr>
+        <p:spPr/>
+        <p:txBody>
+          <a:bodyPr/>
+          <a:lstStyle/>
+          <a:p>
+            <a:endParaRPr lang="en-US"/>
+          </a:p>
+        </p:txBody>
+      </p:sp>
+      <p:sp>
+        <p:nvSpPr>
+          <p:cNvPr id="4" name="Slide Number Placeholder 3"/>
+          <p:cNvSpPr>
+            <a:spLocks noGrp="1"/>
+          </p:cNvSpPr>
+          <p:nvPr>
+            <p:ph type="sldNum" sz="quarter" idx="10"/>
+          </p:nvPr>
+        </p:nvSpPr>
+        <p:spPr/>
+        <p:txBody>
+          <a:bodyPr/>
+          <a:lstStyle/>
+          <a:p>
+            <a:fld id="{E7293BAF-A3DF-4D41-B4FC-78E3151B54AD}" type="slidenum">
+              <a:rPr lang="en-US" smtClean="0"/>
+              <a:t>16</a:t>
+            </a:fld>
+            <a:endParaRPr lang="en-US"/>
+          </a:p>
+        </p:txBody>
+      </p:sp>
+    </p:spTree>
+    <p:extLst>
+      <p:ext uri="{BB962C8B-B14F-4D97-AF65-F5344CB8AC3E}">
+        <p14:creationId xmlns:p14="http://schemas.microsoft.com/office/powerpoint/2010/main" val="2377755539"/>
+      </p:ext>
+    </p:extLst>
+  </p:cSld>
+  <p:clrMapOvr>
+    <a:masterClrMapping/>
+  </p:clrMapOvr>
+</p:notes>
+</file>
+
+<file path=ppt/notesSlides/notesSlide17.xml><?xml version="1.0" encoding="utf-8"?>
+<p:notes xmlns:a="http://schemas.openxmlformats.org/drawingml/2006/main" xmlns:r="http://schemas.openxmlformats.org/officeDocument/2006/relationships" xmlns:p="http://schemas.openxmlformats.org/presentationml/2006/main">
+  <p:cSld>
+    <p:spTree>
+      <p:nvGrpSpPr>
+        <p:cNvPr id="1" name=""/>
+        <p:cNvGrpSpPr/>
+        <p:nvPr/>
+      </p:nvGrpSpPr>
+      <p:grpSpPr>
+        <a:xfrm>
+          <a:off x="0" y="0"/>
+          <a:ext cx="0" cy="0"/>
+          <a:chOff x="0" y="0"/>
+          <a:chExt cx="0" cy="0"/>
+        </a:xfrm>
+      </p:grpSpPr>
+      <p:sp>
+        <p:nvSpPr>
+          <p:cNvPr id="2" name="Slide Image Placeholder 1"/>
+          <p:cNvSpPr>
+            <a:spLocks noGrp="1" noRot="1" noChangeAspect="1"/>
+          </p:cNvSpPr>
+          <p:nvPr>
+            <p:ph type="sldImg"/>
+          </p:nvPr>
+        </p:nvSpPr>
+        <p:spPr/>
+      </p:sp>
+      <p:sp>
+        <p:nvSpPr>
+          <p:cNvPr id="3" name="Notes Placeholder 2"/>
+          <p:cNvSpPr>
+            <a:spLocks noGrp="1"/>
+          </p:cNvSpPr>
+          <p:nvPr>
+            <p:ph type="body" idx="1"/>
+          </p:nvPr>
+        </p:nvSpPr>
+        <p:spPr/>
+        <p:txBody>
+          <a:bodyPr/>
+          <a:lstStyle/>
+          <a:p>
+            <a:endParaRPr lang="en-US"/>
+          </a:p>
+        </p:txBody>
+      </p:sp>
+      <p:sp>
+        <p:nvSpPr>
+          <p:cNvPr id="4" name="Slide Number Placeholder 3"/>
+          <p:cNvSpPr>
+            <a:spLocks noGrp="1"/>
+          </p:cNvSpPr>
+          <p:nvPr>
+            <p:ph type="sldNum" sz="quarter" idx="10"/>
+          </p:nvPr>
+        </p:nvSpPr>
+        <p:spPr/>
+        <p:txBody>
+          <a:bodyPr/>
+          <a:lstStyle/>
+          <a:p>
+            <a:fld id="{E7293BAF-A3DF-4D41-B4FC-78E3151B54AD}" type="slidenum">
+              <a:rPr lang="en-US" smtClean="0"/>
+              <a:t>17</a:t>
+            </a:fld>
+            <a:endParaRPr lang="en-US"/>
+          </a:p>
+        </p:txBody>
+      </p:sp>
+    </p:spTree>
+    <p:extLst>
+      <p:ext uri="{BB962C8B-B14F-4D97-AF65-F5344CB8AC3E}">
+        <p14:creationId xmlns:p14="http://schemas.microsoft.com/office/powerpoint/2010/main" val="1367690236"/>
+      </p:ext>
+    </p:extLst>
+  </p:cSld>
+  <p:clrMapOvr>
+    <a:masterClrMapping/>
+  </p:clrMapOvr>
+</p:notes>
+</file>
+
+<file path=ppt/notesSlides/notesSlide18.xml><?xml version="1.0" encoding="utf-8"?>
+<p:notes xmlns:a="http://schemas.openxmlformats.org/drawingml/2006/main" xmlns:r="http://schemas.openxmlformats.org/officeDocument/2006/relationships" xmlns:p="http://schemas.openxmlformats.org/presentationml/2006/main">
+  <p:cSld>
+    <p:spTree>
+      <p:nvGrpSpPr>
+        <p:cNvPr id="1" name=""/>
+        <p:cNvGrpSpPr/>
+        <p:nvPr/>
+      </p:nvGrpSpPr>
+      <p:grpSpPr>
+        <a:xfrm>
+          <a:off x="0" y="0"/>
+          <a:ext cx="0" cy="0"/>
+          <a:chOff x="0" y="0"/>
+          <a:chExt cx="0" cy="0"/>
+        </a:xfrm>
+      </p:grpSpPr>
+      <p:sp>
+        <p:nvSpPr>
+          <p:cNvPr id="2" name="Slide Image Placeholder 1"/>
+          <p:cNvSpPr>
+            <a:spLocks noGrp="1" noRot="1" noChangeAspect="1"/>
+          </p:cNvSpPr>
+          <p:nvPr>
+            <p:ph type="sldImg"/>
+          </p:nvPr>
+        </p:nvSpPr>
+        <p:spPr/>
+      </p:sp>
+      <p:sp>
+        <p:nvSpPr>
+          <p:cNvPr id="3" name="Notes Placeholder 2"/>
+          <p:cNvSpPr>
+            <a:spLocks noGrp="1"/>
+          </p:cNvSpPr>
+          <p:nvPr>
+            <p:ph type="body" idx="1"/>
+          </p:nvPr>
+        </p:nvSpPr>
+        <p:spPr/>
+        <p:txBody>
+          <a:bodyPr/>
+          <a:lstStyle/>
+          <a:p>
+            <a:endParaRPr lang="en-US"/>
+          </a:p>
+        </p:txBody>
+      </p:sp>
+      <p:sp>
+        <p:nvSpPr>
+          <p:cNvPr id="4" name="Slide Number Placeholder 3"/>
+          <p:cNvSpPr>
+            <a:spLocks noGrp="1"/>
+          </p:cNvSpPr>
+          <p:nvPr>
+            <p:ph type="sldNum" sz="quarter" idx="10"/>
+          </p:nvPr>
+        </p:nvSpPr>
+        <p:spPr/>
+        <p:txBody>
+          <a:bodyPr/>
+          <a:lstStyle/>
+          <a:p>
+            <a:fld id="{E7293BAF-A3DF-4D41-B4FC-78E3151B54AD}" type="slidenum">
+              <a:rPr lang="en-US" smtClean="0"/>
+              <a:t>18</a:t>
+            </a:fld>
+            <a:endParaRPr lang="en-US"/>
+          </a:p>
+        </p:txBody>
+      </p:sp>
+    </p:spTree>
+    <p:extLst>
+      <p:ext uri="{BB962C8B-B14F-4D97-AF65-F5344CB8AC3E}">
+        <p14:creationId xmlns:p14="http://schemas.microsoft.com/office/powerpoint/2010/main" val="288794495"/>
+      </p:ext>
+    </p:extLst>
+  </p:cSld>
+  <p:clrMapOvr>
+    <a:masterClrMapping/>
+  </p:clrMapOvr>
+</p:notes>
+</file>
+
+<file path=ppt/notesSlides/notesSlide19.xml><?xml version="1.0" encoding="utf-8"?>
+<p:notes xmlns:a="http://schemas.openxmlformats.org/drawingml/2006/main" xmlns:r="http://schemas.openxmlformats.org/officeDocument/2006/relationships" xmlns:p="http://schemas.openxmlformats.org/presentationml/2006/main">
+  <p:cSld>
+    <p:spTree>
+      <p:nvGrpSpPr>
+        <p:cNvPr id="1" name=""/>
+        <p:cNvGrpSpPr/>
+        <p:nvPr/>
+      </p:nvGrpSpPr>
+      <p:grpSpPr>
+        <a:xfrm>
+          <a:off x="0" y="0"/>
+          <a:ext cx="0" cy="0"/>
+          <a:chOff x="0" y="0"/>
+          <a:chExt cx="0" cy="0"/>
+        </a:xfrm>
+      </p:grpSpPr>
+      <p:sp>
+        <p:nvSpPr>
+          <p:cNvPr id="2" name="Slide Image Placeholder 1"/>
+          <p:cNvSpPr>
+            <a:spLocks noGrp="1" noRot="1" noChangeAspect="1"/>
+          </p:cNvSpPr>
+          <p:nvPr>
+            <p:ph type="sldImg"/>
+          </p:nvPr>
+        </p:nvSpPr>
+        <p:spPr/>
+      </p:sp>
+      <p:sp>
+        <p:nvSpPr>
+          <p:cNvPr id="3" name="Notes Placeholder 2"/>
+          <p:cNvSpPr>
+            <a:spLocks noGrp="1"/>
+          </p:cNvSpPr>
+          <p:nvPr>
+            <p:ph type="body" idx="1"/>
+          </p:nvPr>
+        </p:nvSpPr>
+        <p:spPr/>
+        <p:txBody>
+          <a:bodyPr/>
+          <a:lstStyle/>
+          <a:p>
+            <a:endParaRPr lang="en-US"/>
+          </a:p>
+        </p:txBody>
+      </p:sp>
+      <p:sp>
+        <p:nvSpPr>
+          <p:cNvPr id="4" name="Slide Number Placeholder 3"/>
+          <p:cNvSpPr>
+            <a:spLocks noGrp="1"/>
+          </p:cNvSpPr>
+          <p:nvPr>
+            <p:ph type="sldNum" sz="quarter" idx="10"/>
+          </p:nvPr>
+        </p:nvSpPr>
+        <p:spPr/>
+        <p:txBody>
+          <a:bodyPr/>
+          <a:lstStyle/>
+          <a:p>
+            <a:fld id="{E7293BAF-A3DF-4D41-B4FC-78E3151B54AD}" type="slidenum">
+              <a:rPr lang="en-US" smtClean="0"/>
+              <a:t>19</a:t>
+            </a:fld>
+            <a:endParaRPr lang="en-US"/>
+          </a:p>
+        </p:txBody>
+      </p:sp>
+    </p:spTree>
+    <p:extLst>
+      <p:ext uri="{BB962C8B-B14F-4D97-AF65-F5344CB8AC3E}">
+        <p14:creationId xmlns:p14="http://schemas.microsoft.com/office/powerpoint/2010/main" val="1170412643"/>
+      </p:ext>
+    </p:extLst>
+  </p:cSld>
+  <p:clrMapOvr>
+    <a:masterClrMapping/>
+  </p:clrMapOvr>
+</p:notes>
+</file>
+
 <file path=ppt/notesSlides/notesSlide2.xml><?xml version="1.0" encoding="utf-8"?>
 <p:notes xmlns:a="http://schemas.openxmlformats.org/drawingml/2006/main" xmlns:r="http://schemas.openxmlformats.org/officeDocument/2006/relationships" xmlns:p="http://schemas.openxmlformats.org/presentationml/2006/main">
   <p:cSld>
@@ -646,6 +1486,342 @@
     <p:extLst>
       <p:ext uri="{BB962C8B-B14F-4D97-AF65-F5344CB8AC3E}">
         <p14:creationId xmlns:p14="http://schemas.microsoft.com/office/powerpoint/2010/main" val="1862246395"/>
+      </p:ext>
+    </p:extLst>
+  </p:cSld>
+  <p:clrMapOvr>
+    <a:masterClrMapping/>
+  </p:clrMapOvr>
+</p:notes>
+</file>
+
+<file path=ppt/notesSlides/notesSlide20.xml><?xml version="1.0" encoding="utf-8"?>
+<p:notes xmlns:a="http://schemas.openxmlformats.org/drawingml/2006/main" xmlns:r="http://schemas.openxmlformats.org/officeDocument/2006/relationships" xmlns:p="http://schemas.openxmlformats.org/presentationml/2006/main">
+  <p:cSld>
+    <p:spTree>
+      <p:nvGrpSpPr>
+        <p:cNvPr id="1" name=""/>
+        <p:cNvGrpSpPr/>
+        <p:nvPr/>
+      </p:nvGrpSpPr>
+      <p:grpSpPr>
+        <a:xfrm>
+          <a:off x="0" y="0"/>
+          <a:ext cx="0" cy="0"/>
+          <a:chOff x="0" y="0"/>
+          <a:chExt cx="0" cy="0"/>
+        </a:xfrm>
+      </p:grpSpPr>
+      <p:sp>
+        <p:nvSpPr>
+          <p:cNvPr id="2" name="Slide Image Placeholder 1"/>
+          <p:cNvSpPr>
+            <a:spLocks noGrp="1" noRot="1" noChangeAspect="1"/>
+          </p:cNvSpPr>
+          <p:nvPr>
+            <p:ph type="sldImg"/>
+          </p:nvPr>
+        </p:nvSpPr>
+        <p:spPr/>
+      </p:sp>
+      <p:sp>
+        <p:nvSpPr>
+          <p:cNvPr id="3" name="Notes Placeholder 2"/>
+          <p:cNvSpPr>
+            <a:spLocks noGrp="1"/>
+          </p:cNvSpPr>
+          <p:nvPr>
+            <p:ph type="body" idx="1"/>
+          </p:nvPr>
+        </p:nvSpPr>
+        <p:spPr/>
+        <p:txBody>
+          <a:bodyPr/>
+          <a:lstStyle/>
+          <a:p>
+            <a:endParaRPr lang="en-US"/>
+          </a:p>
+        </p:txBody>
+      </p:sp>
+      <p:sp>
+        <p:nvSpPr>
+          <p:cNvPr id="4" name="Slide Number Placeholder 3"/>
+          <p:cNvSpPr>
+            <a:spLocks noGrp="1"/>
+          </p:cNvSpPr>
+          <p:nvPr>
+            <p:ph type="sldNum" sz="quarter" idx="10"/>
+          </p:nvPr>
+        </p:nvSpPr>
+        <p:spPr/>
+        <p:txBody>
+          <a:bodyPr/>
+          <a:lstStyle/>
+          <a:p>
+            <a:fld id="{E7293BAF-A3DF-4D41-B4FC-78E3151B54AD}" type="slidenum">
+              <a:rPr lang="en-US" smtClean="0"/>
+              <a:t>20</a:t>
+            </a:fld>
+            <a:endParaRPr lang="en-US"/>
+          </a:p>
+        </p:txBody>
+      </p:sp>
+    </p:spTree>
+    <p:extLst>
+      <p:ext uri="{BB962C8B-B14F-4D97-AF65-F5344CB8AC3E}">
+        <p14:creationId xmlns:p14="http://schemas.microsoft.com/office/powerpoint/2010/main" val="3446148215"/>
+      </p:ext>
+    </p:extLst>
+  </p:cSld>
+  <p:clrMapOvr>
+    <a:masterClrMapping/>
+  </p:clrMapOvr>
+</p:notes>
+</file>
+
+<file path=ppt/notesSlides/notesSlide21.xml><?xml version="1.0" encoding="utf-8"?>
+<p:notes xmlns:a="http://schemas.openxmlformats.org/drawingml/2006/main" xmlns:r="http://schemas.openxmlformats.org/officeDocument/2006/relationships" xmlns:p="http://schemas.openxmlformats.org/presentationml/2006/main">
+  <p:cSld>
+    <p:spTree>
+      <p:nvGrpSpPr>
+        <p:cNvPr id="1" name=""/>
+        <p:cNvGrpSpPr/>
+        <p:nvPr/>
+      </p:nvGrpSpPr>
+      <p:grpSpPr>
+        <a:xfrm>
+          <a:off x="0" y="0"/>
+          <a:ext cx="0" cy="0"/>
+          <a:chOff x="0" y="0"/>
+          <a:chExt cx="0" cy="0"/>
+        </a:xfrm>
+      </p:grpSpPr>
+      <p:sp>
+        <p:nvSpPr>
+          <p:cNvPr id="2" name="Slide Image Placeholder 1"/>
+          <p:cNvSpPr>
+            <a:spLocks noGrp="1" noRot="1" noChangeAspect="1"/>
+          </p:cNvSpPr>
+          <p:nvPr>
+            <p:ph type="sldImg"/>
+          </p:nvPr>
+        </p:nvSpPr>
+        <p:spPr/>
+      </p:sp>
+      <p:sp>
+        <p:nvSpPr>
+          <p:cNvPr id="3" name="Notes Placeholder 2"/>
+          <p:cNvSpPr>
+            <a:spLocks noGrp="1"/>
+          </p:cNvSpPr>
+          <p:nvPr>
+            <p:ph type="body" idx="1"/>
+          </p:nvPr>
+        </p:nvSpPr>
+        <p:spPr/>
+        <p:txBody>
+          <a:bodyPr/>
+          <a:lstStyle/>
+          <a:p>
+            <a:endParaRPr lang="en-US"/>
+          </a:p>
+        </p:txBody>
+      </p:sp>
+      <p:sp>
+        <p:nvSpPr>
+          <p:cNvPr id="4" name="Slide Number Placeholder 3"/>
+          <p:cNvSpPr>
+            <a:spLocks noGrp="1"/>
+          </p:cNvSpPr>
+          <p:nvPr>
+            <p:ph type="sldNum" sz="quarter" idx="10"/>
+          </p:nvPr>
+        </p:nvSpPr>
+        <p:spPr/>
+        <p:txBody>
+          <a:bodyPr/>
+          <a:lstStyle/>
+          <a:p>
+            <a:fld id="{E7293BAF-A3DF-4D41-B4FC-78E3151B54AD}" type="slidenum">
+              <a:rPr lang="en-US" smtClean="0"/>
+              <a:t>21</a:t>
+            </a:fld>
+            <a:endParaRPr lang="en-US"/>
+          </a:p>
+        </p:txBody>
+      </p:sp>
+    </p:spTree>
+    <p:extLst>
+      <p:ext uri="{BB962C8B-B14F-4D97-AF65-F5344CB8AC3E}">
+        <p14:creationId xmlns:p14="http://schemas.microsoft.com/office/powerpoint/2010/main" val="2604248669"/>
+      </p:ext>
+    </p:extLst>
+  </p:cSld>
+  <p:clrMapOvr>
+    <a:masterClrMapping/>
+  </p:clrMapOvr>
+</p:notes>
+</file>
+
+<file path=ppt/notesSlides/notesSlide22.xml><?xml version="1.0" encoding="utf-8"?>
+<p:notes xmlns:a="http://schemas.openxmlformats.org/drawingml/2006/main" xmlns:r="http://schemas.openxmlformats.org/officeDocument/2006/relationships" xmlns:p="http://schemas.openxmlformats.org/presentationml/2006/main">
+  <p:cSld>
+    <p:spTree>
+      <p:nvGrpSpPr>
+        <p:cNvPr id="1" name=""/>
+        <p:cNvGrpSpPr/>
+        <p:nvPr/>
+      </p:nvGrpSpPr>
+      <p:grpSpPr>
+        <a:xfrm>
+          <a:off x="0" y="0"/>
+          <a:ext cx="0" cy="0"/>
+          <a:chOff x="0" y="0"/>
+          <a:chExt cx="0" cy="0"/>
+        </a:xfrm>
+      </p:grpSpPr>
+      <p:sp>
+        <p:nvSpPr>
+          <p:cNvPr id="2" name="Slide Image Placeholder 1"/>
+          <p:cNvSpPr>
+            <a:spLocks noGrp="1" noRot="1" noChangeAspect="1"/>
+          </p:cNvSpPr>
+          <p:nvPr>
+            <p:ph type="sldImg"/>
+          </p:nvPr>
+        </p:nvSpPr>
+        <p:spPr/>
+      </p:sp>
+      <p:sp>
+        <p:nvSpPr>
+          <p:cNvPr id="3" name="Notes Placeholder 2"/>
+          <p:cNvSpPr>
+            <a:spLocks noGrp="1"/>
+          </p:cNvSpPr>
+          <p:nvPr>
+            <p:ph type="body" idx="1"/>
+          </p:nvPr>
+        </p:nvSpPr>
+        <p:spPr/>
+        <p:txBody>
+          <a:bodyPr/>
+          <a:lstStyle/>
+          <a:p>
+            <a:endParaRPr lang="en-US"/>
+          </a:p>
+        </p:txBody>
+      </p:sp>
+      <p:sp>
+        <p:nvSpPr>
+          <p:cNvPr id="4" name="Slide Number Placeholder 3"/>
+          <p:cNvSpPr>
+            <a:spLocks noGrp="1"/>
+          </p:cNvSpPr>
+          <p:nvPr>
+            <p:ph type="sldNum" sz="quarter" idx="10"/>
+          </p:nvPr>
+        </p:nvSpPr>
+        <p:spPr/>
+        <p:txBody>
+          <a:bodyPr/>
+          <a:lstStyle/>
+          <a:p>
+            <a:fld id="{E7293BAF-A3DF-4D41-B4FC-78E3151B54AD}" type="slidenum">
+              <a:rPr lang="en-US" smtClean="0"/>
+              <a:t>22</a:t>
+            </a:fld>
+            <a:endParaRPr lang="en-US"/>
+          </a:p>
+        </p:txBody>
+      </p:sp>
+    </p:spTree>
+    <p:extLst>
+      <p:ext uri="{BB962C8B-B14F-4D97-AF65-F5344CB8AC3E}">
+        <p14:creationId xmlns:p14="http://schemas.microsoft.com/office/powerpoint/2010/main" val="1595021412"/>
+      </p:ext>
+    </p:extLst>
+  </p:cSld>
+  <p:clrMapOvr>
+    <a:masterClrMapping/>
+  </p:clrMapOvr>
+</p:notes>
+</file>
+
+<file path=ppt/notesSlides/notesSlide23.xml><?xml version="1.0" encoding="utf-8"?>
+<p:notes xmlns:a="http://schemas.openxmlformats.org/drawingml/2006/main" xmlns:r="http://schemas.openxmlformats.org/officeDocument/2006/relationships" xmlns:p="http://schemas.openxmlformats.org/presentationml/2006/main">
+  <p:cSld>
+    <p:spTree>
+      <p:nvGrpSpPr>
+        <p:cNvPr id="1" name=""/>
+        <p:cNvGrpSpPr/>
+        <p:nvPr/>
+      </p:nvGrpSpPr>
+      <p:grpSpPr>
+        <a:xfrm>
+          <a:off x="0" y="0"/>
+          <a:ext cx="0" cy="0"/>
+          <a:chOff x="0" y="0"/>
+          <a:chExt cx="0" cy="0"/>
+        </a:xfrm>
+      </p:grpSpPr>
+      <p:sp>
+        <p:nvSpPr>
+          <p:cNvPr id="2" name="Slide Image Placeholder 1"/>
+          <p:cNvSpPr>
+            <a:spLocks noGrp="1" noRot="1" noChangeAspect="1"/>
+          </p:cNvSpPr>
+          <p:nvPr>
+            <p:ph type="sldImg"/>
+          </p:nvPr>
+        </p:nvSpPr>
+        <p:spPr/>
+      </p:sp>
+      <p:sp>
+        <p:nvSpPr>
+          <p:cNvPr id="3" name="Notes Placeholder 2"/>
+          <p:cNvSpPr>
+            <a:spLocks noGrp="1"/>
+          </p:cNvSpPr>
+          <p:nvPr>
+            <p:ph type="body" idx="1"/>
+          </p:nvPr>
+        </p:nvSpPr>
+        <p:spPr/>
+        <p:txBody>
+          <a:bodyPr/>
+          <a:lstStyle/>
+          <a:p>
+            <a:endParaRPr lang="en-US"/>
+          </a:p>
+        </p:txBody>
+      </p:sp>
+      <p:sp>
+        <p:nvSpPr>
+          <p:cNvPr id="4" name="Slide Number Placeholder 3"/>
+          <p:cNvSpPr>
+            <a:spLocks noGrp="1"/>
+          </p:cNvSpPr>
+          <p:nvPr>
+            <p:ph type="sldNum" sz="quarter" idx="10"/>
+          </p:nvPr>
+        </p:nvSpPr>
+        <p:spPr/>
+        <p:txBody>
+          <a:bodyPr/>
+          <a:lstStyle/>
+          <a:p>
+            <a:fld id="{E7293BAF-A3DF-4D41-B4FC-78E3151B54AD}" type="slidenum">
+              <a:rPr lang="en-US" smtClean="0"/>
+              <a:t>23</a:t>
+            </a:fld>
+            <a:endParaRPr lang="en-US"/>
+          </a:p>
+        </p:txBody>
+      </p:sp>
+    </p:spTree>
+    <p:extLst>
+      <p:ext uri="{BB962C8B-B14F-4D97-AF65-F5344CB8AC3E}">
+        <p14:creationId xmlns:p14="http://schemas.microsoft.com/office/powerpoint/2010/main" val="3320654427"/>
       </p:ext>
     </p:extLst>
   </p:cSld>
@@ -730,6 +1906,510 @@
     <p:extLst>
       <p:ext uri="{BB962C8B-B14F-4D97-AF65-F5344CB8AC3E}">
         <p14:creationId xmlns:p14="http://schemas.microsoft.com/office/powerpoint/2010/main" val="3768477523"/>
+      </p:ext>
+    </p:extLst>
+  </p:cSld>
+  <p:clrMapOvr>
+    <a:masterClrMapping/>
+  </p:clrMapOvr>
+</p:notes>
+</file>
+
+<file path=ppt/notesSlides/notesSlide4.xml><?xml version="1.0" encoding="utf-8"?>
+<p:notes xmlns:a="http://schemas.openxmlformats.org/drawingml/2006/main" xmlns:r="http://schemas.openxmlformats.org/officeDocument/2006/relationships" xmlns:p="http://schemas.openxmlformats.org/presentationml/2006/main">
+  <p:cSld>
+    <p:spTree>
+      <p:nvGrpSpPr>
+        <p:cNvPr id="1" name=""/>
+        <p:cNvGrpSpPr/>
+        <p:nvPr/>
+      </p:nvGrpSpPr>
+      <p:grpSpPr>
+        <a:xfrm>
+          <a:off x="0" y="0"/>
+          <a:ext cx="0" cy="0"/>
+          <a:chOff x="0" y="0"/>
+          <a:chExt cx="0" cy="0"/>
+        </a:xfrm>
+      </p:grpSpPr>
+      <p:sp>
+        <p:nvSpPr>
+          <p:cNvPr id="2" name="Slide Image Placeholder 1"/>
+          <p:cNvSpPr>
+            <a:spLocks noGrp="1" noRot="1" noChangeAspect="1"/>
+          </p:cNvSpPr>
+          <p:nvPr>
+            <p:ph type="sldImg"/>
+          </p:nvPr>
+        </p:nvSpPr>
+        <p:spPr/>
+      </p:sp>
+      <p:sp>
+        <p:nvSpPr>
+          <p:cNvPr id="3" name="Notes Placeholder 2"/>
+          <p:cNvSpPr>
+            <a:spLocks noGrp="1"/>
+          </p:cNvSpPr>
+          <p:nvPr>
+            <p:ph type="body" idx="1"/>
+          </p:nvPr>
+        </p:nvSpPr>
+        <p:spPr/>
+        <p:txBody>
+          <a:bodyPr/>
+          <a:lstStyle/>
+          <a:p>
+            <a:endParaRPr lang="en-US"/>
+          </a:p>
+        </p:txBody>
+      </p:sp>
+      <p:sp>
+        <p:nvSpPr>
+          <p:cNvPr id="4" name="Slide Number Placeholder 3"/>
+          <p:cNvSpPr>
+            <a:spLocks noGrp="1"/>
+          </p:cNvSpPr>
+          <p:nvPr>
+            <p:ph type="sldNum" sz="quarter" idx="10"/>
+          </p:nvPr>
+        </p:nvSpPr>
+        <p:spPr/>
+        <p:txBody>
+          <a:bodyPr/>
+          <a:lstStyle/>
+          <a:p>
+            <a:fld id="{E7293BAF-A3DF-4D41-B4FC-78E3151B54AD}" type="slidenum">
+              <a:rPr lang="en-US" smtClean="0"/>
+              <a:t>4</a:t>
+            </a:fld>
+            <a:endParaRPr lang="en-US"/>
+          </a:p>
+        </p:txBody>
+      </p:sp>
+    </p:spTree>
+    <p:extLst>
+      <p:ext uri="{BB962C8B-B14F-4D97-AF65-F5344CB8AC3E}">
+        <p14:creationId xmlns:p14="http://schemas.microsoft.com/office/powerpoint/2010/main" val="2787305639"/>
+      </p:ext>
+    </p:extLst>
+  </p:cSld>
+  <p:clrMapOvr>
+    <a:masterClrMapping/>
+  </p:clrMapOvr>
+</p:notes>
+</file>
+
+<file path=ppt/notesSlides/notesSlide5.xml><?xml version="1.0" encoding="utf-8"?>
+<p:notes xmlns:a="http://schemas.openxmlformats.org/drawingml/2006/main" xmlns:r="http://schemas.openxmlformats.org/officeDocument/2006/relationships" xmlns:p="http://schemas.openxmlformats.org/presentationml/2006/main">
+  <p:cSld>
+    <p:spTree>
+      <p:nvGrpSpPr>
+        <p:cNvPr id="1" name=""/>
+        <p:cNvGrpSpPr/>
+        <p:nvPr/>
+      </p:nvGrpSpPr>
+      <p:grpSpPr>
+        <a:xfrm>
+          <a:off x="0" y="0"/>
+          <a:ext cx="0" cy="0"/>
+          <a:chOff x="0" y="0"/>
+          <a:chExt cx="0" cy="0"/>
+        </a:xfrm>
+      </p:grpSpPr>
+      <p:sp>
+        <p:nvSpPr>
+          <p:cNvPr id="2" name="Slide Image Placeholder 1"/>
+          <p:cNvSpPr>
+            <a:spLocks noGrp="1" noRot="1" noChangeAspect="1"/>
+          </p:cNvSpPr>
+          <p:nvPr>
+            <p:ph type="sldImg"/>
+          </p:nvPr>
+        </p:nvSpPr>
+        <p:spPr/>
+      </p:sp>
+      <p:sp>
+        <p:nvSpPr>
+          <p:cNvPr id="3" name="Notes Placeholder 2"/>
+          <p:cNvSpPr>
+            <a:spLocks noGrp="1"/>
+          </p:cNvSpPr>
+          <p:nvPr>
+            <p:ph type="body" idx="1"/>
+          </p:nvPr>
+        </p:nvSpPr>
+        <p:spPr/>
+        <p:txBody>
+          <a:bodyPr/>
+          <a:lstStyle/>
+          <a:p>
+            <a:endParaRPr lang="en-US"/>
+          </a:p>
+        </p:txBody>
+      </p:sp>
+      <p:sp>
+        <p:nvSpPr>
+          <p:cNvPr id="4" name="Slide Number Placeholder 3"/>
+          <p:cNvSpPr>
+            <a:spLocks noGrp="1"/>
+          </p:cNvSpPr>
+          <p:nvPr>
+            <p:ph type="sldNum" sz="quarter" idx="10"/>
+          </p:nvPr>
+        </p:nvSpPr>
+        <p:spPr/>
+        <p:txBody>
+          <a:bodyPr/>
+          <a:lstStyle/>
+          <a:p>
+            <a:fld id="{E7293BAF-A3DF-4D41-B4FC-78E3151B54AD}" type="slidenum">
+              <a:rPr lang="en-US" smtClean="0"/>
+              <a:t>5</a:t>
+            </a:fld>
+            <a:endParaRPr lang="en-US"/>
+          </a:p>
+        </p:txBody>
+      </p:sp>
+    </p:spTree>
+    <p:extLst>
+      <p:ext uri="{BB962C8B-B14F-4D97-AF65-F5344CB8AC3E}">
+        <p14:creationId xmlns:p14="http://schemas.microsoft.com/office/powerpoint/2010/main" val="1991013342"/>
+      </p:ext>
+    </p:extLst>
+  </p:cSld>
+  <p:clrMapOvr>
+    <a:masterClrMapping/>
+  </p:clrMapOvr>
+</p:notes>
+</file>
+
+<file path=ppt/notesSlides/notesSlide6.xml><?xml version="1.0" encoding="utf-8"?>
+<p:notes xmlns:a="http://schemas.openxmlformats.org/drawingml/2006/main" xmlns:r="http://schemas.openxmlformats.org/officeDocument/2006/relationships" xmlns:p="http://schemas.openxmlformats.org/presentationml/2006/main">
+  <p:cSld>
+    <p:spTree>
+      <p:nvGrpSpPr>
+        <p:cNvPr id="1" name=""/>
+        <p:cNvGrpSpPr/>
+        <p:nvPr/>
+      </p:nvGrpSpPr>
+      <p:grpSpPr>
+        <a:xfrm>
+          <a:off x="0" y="0"/>
+          <a:ext cx="0" cy="0"/>
+          <a:chOff x="0" y="0"/>
+          <a:chExt cx="0" cy="0"/>
+        </a:xfrm>
+      </p:grpSpPr>
+      <p:sp>
+        <p:nvSpPr>
+          <p:cNvPr id="2" name="Slide Image Placeholder 1"/>
+          <p:cNvSpPr>
+            <a:spLocks noGrp="1" noRot="1" noChangeAspect="1"/>
+          </p:cNvSpPr>
+          <p:nvPr>
+            <p:ph type="sldImg"/>
+          </p:nvPr>
+        </p:nvSpPr>
+        <p:spPr/>
+      </p:sp>
+      <p:sp>
+        <p:nvSpPr>
+          <p:cNvPr id="3" name="Notes Placeholder 2"/>
+          <p:cNvSpPr>
+            <a:spLocks noGrp="1"/>
+          </p:cNvSpPr>
+          <p:nvPr>
+            <p:ph type="body" idx="1"/>
+          </p:nvPr>
+        </p:nvSpPr>
+        <p:spPr/>
+        <p:txBody>
+          <a:bodyPr/>
+          <a:lstStyle/>
+          <a:p>
+            <a:endParaRPr lang="en-US"/>
+          </a:p>
+        </p:txBody>
+      </p:sp>
+      <p:sp>
+        <p:nvSpPr>
+          <p:cNvPr id="4" name="Slide Number Placeholder 3"/>
+          <p:cNvSpPr>
+            <a:spLocks noGrp="1"/>
+          </p:cNvSpPr>
+          <p:nvPr>
+            <p:ph type="sldNum" sz="quarter" idx="10"/>
+          </p:nvPr>
+        </p:nvSpPr>
+        <p:spPr/>
+        <p:txBody>
+          <a:bodyPr/>
+          <a:lstStyle/>
+          <a:p>
+            <a:fld id="{E7293BAF-A3DF-4D41-B4FC-78E3151B54AD}" type="slidenum">
+              <a:rPr lang="en-US" smtClean="0"/>
+              <a:t>6</a:t>
+            </a:fld>
+            <a:endParaRPr lang="en-US"/>
+          </a:p>
+        </p:txBody>
+      </p:sp>
+    </p:spTree>
+    <p:extLst>
+      <p:ext uri="{BB962C8B-B14F-4D97-AF65-F5344CB8AC3E}">
+        <p14:creationId xmlns:p14="http://schemas.microsoft.com/office/powerpoint/2010/main" val="300980572"/>
+      </p:ext>
+    </p:extLst>
+  </p:cSld>
+  <p:clrMapOvr>
+    <a:masterClrMapping/>
+  </p:clrMapOvr>
+</p:notes>
+</file>
+
+<file path=ppt/notesSlides/notesSlide7.xml><?xml version="1.0" encoding="utf-8"?>
+<p:notes xmlns:a="http://schemas.openxmlformats.org/drawingml/2006/main" xmlns:r="http://schemas.openxmlformats.org/officeDocument/2006/relationships" xmlns:p="http://schemas.openxmlformats.org/presentationml/2006/main">
+  <p:cSld>
+    <p:spTree>
+      <p:nvGrpSpPr>
+        <p:cNvPr id="1" name=""/>
+        <p:cNvGrpSpPr/>
+        <p:nvPr/>
+      </p:nvGrpSpPr>
+      <p:grpSpPr>
+        <a:xfrm>
+          <a:off x="0" y="0"/>
+          <a:ext cx="0" cy="0"/>
+          <a:chOff x="0" y="0"/>
+          <a:chExt cx="0" cy="0"/>
+        </a:xfrm>
+      </p:grpSpPr>
+      <p:sp>
+        <p:nvSpPr>
+          <p:cNvPr id="2" name="Slide Image Placeholder 1"/>
+          <p:cNvSpPr>
+            <a:spLocks noGrp="1" noRot="1" noChangeAspect="1"/>
+          </p:cNvSpPr>
+          <p:nvPr>
+            <p:ph type="sldImg"/>
+          </p:nvPr>
+        </p:nvSpPr>
+        <p:spPr/>
+      </p:sp>
+      <p:sp>
+        <p:nvSpPr>
+          <p:cNvPr id="3" name="Notes Placeholder 2"/>
+          <p:cNvSpPr>
+            <a:spLocks noGrp="1"/>
+          </p:cNvSpPr>
+          <p:nvPr>
+            <p:ph type="body" idx="1"/>
+          </p:nvPr>
+        </p:nvSpPr>
+        <p:spPr/>
+        <p:txBody>
+          <a:bodyPr/>
+          <a:lstStyle/>
+          <a:p>
+            <a:endParaRPr lang="en-US"/>
+          </a:p>
+        </p:txBody>
+      </p:sp>
+      <p:sp>
+        <p:nvSpPr>
+          <p:cNvPr id="4" name="Slide Number Placeholder 3"/>
+          <p:cNvSpPr>
+            <a:spLocks noGrp="1"/>
+          </p:cNvSpPr>
+          <p:nvPr>
+            <p:ph type="sldNum" sz="quarter" idx="10"/>
+          </p:nvPr>
+        </p:nvSpPr>
+        <p:spPr/>
+        <p:txBody>
+          <a:bodyPr/>
+          <a:lstStyle/>
+          <a:p>
+            <a:fld id="{E7293BAF-A3DF-4D41-B4FC-78E3151B54AD}" type="slidenum">
+              <a:rPr lang="en-US" smtClean="0"/>
+              <a:t>7</a:t>
+            </a:fld>
+            <a:endParaRPr lang="en-US"/>
+          </a:p>
+        </p:txBody>
+      </p:sp>
+    </p:spTree>
+    <p:extLst>
+      <p:ext uri="{BB962C8B-B14F-4D97-AF65-F5344CB8AC3E}">
+        <p14:creationId xmlns:p14="http://schemas.microsoft.com/office/powerpoint/2010/main" val="139649213"/>
+      </p:ext>
+    </p:extLst>
+  </p:cSld>
+  <p:clrMapOvr>
+    <a:masterClrMapping/>
+  </p:clrMapOvr>
+</p:notes>
+</file>
+
+<file path=ppt/notesSlides/notesSlide8.xml><?xml version="1.0" encoding="utf-8"?>
+<p:notes xmlns:a="http://schemas.openxmlformats.org/drawingml/2006/main" xmlns:r="http://schemas.openxmlformats.org/officeDocument/2006/relationships" xmlns:p="http://schemas.openxmlformats.org/presentationml/2006/main">
+  <p:cSld>
+    <p:spTree>
+      <p:nvGrpSpPr>
+        <p:cNvPr id="1" name=""/>
+        <p:cNvGrpSpPr/>
+        <p:nvPr/>
+      </p:nvGrpSpPr>
+      <p:grpSpPr>
+        <a:xfrm>
+          <a:off x="0" y="0"/>
+          <a:ext cx="0" cy="0"/>
+          <a:chOff x="0" y="0"/>
+          <a:chExt cx="0" cy="0"/>
+        </a:xfrm>
+      </p:grpSpPr>
+      <p:sp>
+        <p:nvSpPr>
+          <p:cNvPr id="2" name="Slide Image Placeholder 1"/>
+          <p:cNvSpPr>
+            <a:spLocks noGrp="1" noRot="1" noChangeAspect="1"/>
+          </p:cNvSpPr>
+          <p:nvPr>
+            <p:ph type="sldImg"/>
+          </p:nvPr>
+        </p:nvSpPr>
+        <p:spPr/>
+      </p:sp>
+      <p:sp>
+        <p:nvSpPr>
+          <p:cNvPr id="3" name="Notes Placeholder 2"/>
+          <p:cNvSpPr>
+            <a:spLocks noGrp="1"/>
+          </p:cNvSpPr>
+          <p:nvPr>
+            <p:ph type="body" idx="1"/>
+          </p:nvPr>
+        </p:nvSpPr>
+        <p:spPr/>
+        <p:txBody>
+          <a:bodyPr/>
+          <a:lstStyle/>
+          <a:p>
+            <a:endParaRPr lang="en-US"/>
+          </a:p>
+        </p:txBody>
+      </p:sp>
+      <p:sp>
+        <p:nvSpPr>
+          <p:cNvPr id="4" name="Slide Number Placeholder 3"/>
+          <p:cNvSpPr>
+            <a:spLocks noGrp="1"/>
+          </p:cNvSpPr>
+          <p:nvPr>
+            <p:ph type="sldNum" sz="quarter" idx="10"/>
+          </p:nvPr>
+        </p:nvSpPr>
+        <p:spPr/>
+        <p:txBody>
+          <a:bodyPr/>
+          <a:lstStyle/>
+          <a:p>
+            <a:fld id="{E7293BAF-A3DF-4D41-B4FC-78E3151B54AD}" type="slidenum">
+              <a:rPr lang="en-US" smtClean="0"/>
+              <a:t>8</a:t>
+            </a:fld>
+            <a:endParaRPr lang="en-US"/>
+          </a:p>
+        </p:txBody>
+      </p:sp>
+    </p:spTree>
+    <p:extLst>
+      <p:ext uri="{BB962C8B-B14F-4D97-AF65-F5344CB8AC3E}">
+        <p14:creationId xmlns:p14="http://schemas.microsoft.com/office/powerpoint/2010/main" val="126990047"/>
+      </p:ext>
+    </p:extLst>
+  </p:cSld>
+  <p:clrMapOvr>
+    <a:masterClrMapping/>
+  </p:clrMapOvr>
+</p:notes>
+</file>
+
+<file path=ppt/notesSlides/notesSlide9.xml><?xml version="1.0" encoding="utf-8"?>
+<p:notes xmlns:a="http://schemas.openxmlformats.org/drawingml/2006/main" xmlns:r="http://schemas.openxmlformats.org/officeDocument/2006/relationships" xmlns:p="http://schemas.openxmlformats.org/presentationml/2006/main">
+  <p:cSld>
+    <p:spTree>
+      <p:nvGrpSpPr>
+        <p:cNvPr id="1" name=""/>
+        <p:cNvGrpSpPr/>
+        <p:nvPr/>
+      </p:nvGrpSpPr>
+      <p:grpSpPr>
+        <a:xfrm>
+          <a:off x="0" y="0"/>
+          <a:ext cx="0" cy="0"/>
+          <a:chOff x="0" y="0"/>
+          <a:chExt cx="0" cy="0"/>
+        </a:xfrm>
+      </p:grpSpPr>
+      <p:sp>
+        <p:nvSpPr>
+          <p:cNvPr id="2" name="Slide Image Placeholder 1"/>
+          <p:cNvSpPr>
+            <a:spLocks noGrp="1" noRot="1" noChangeAspect="1"/>
+          </p:cNvSpPr>
+          <p:nvPr>
+            <p:ph type="sldImg"/>
+          </p:nvPr>
+        </p:nvSpPr>
+        <p:spPr/>
+      </p:sp>
+      <p:sp>
+        <p:nvSpPr>
+          <p:cNvPr id="3" name="Notes Placeholder 2"/>
+          <p:cNvSpPr>
+            <a:spLocks noGrp="1"/>
+          </p:cNvSpPr>
+          <p:nvPr>
+            <p:ph type="body" idx="1"/>
+          </p:nvPr>
+        </p:nvSpPr>
+        <p:spPr/>
+        <p:txBody>
+          <a:bodyPr/>
+          <a:lstStyle/>
+          <a:p>
+            <a:endParaRPr lang="en-US"/>
+          </a:p>
+        </p:txBody>
+      </p:sp>
+      <p:sp>
+        <p:nvSpPr>
+          <p:cNvPr id="4" name="Slide Number Placeholder 3"/>
+          <p:cNvSpPr>
+            <a:spLocks noGrp="1"/>
+          </p:cNvSpPr>
+          <p:nvPr>
+            <p:ph type="sldNum" sz="quarter" idx="10"/>
+          </p:nvPr>
+        </p:nvSpPr>
+        <p:spPr/>
+        <p:txBody>
+          <a:bodyPr/>
+          <a:lstStyle/>
+          <a:p>
+            <a:fld id="{E7293BAF-A3DF-4D41-B4FC-78E3151B54AD}" type="slidenum">
+              <a:rPr lang="en-US" smtClean="0"/>
+              <a:t>9</a:t>
+            </a:fld>
+            <a:endParaRPr lang="en-US"/>
+          </a:p>
+        </p:txBody>
+      </p:sp>
+    </p:spTree>
+    <p:extLst>
+      <p:ext uri="{BB962C8B-B14F-4D97-AF65-F5344CB8AC3E}">
+        <p14:creationId xmlns:p14="http://schemas.microsoft.com/office/powerpoint/2010/main" val="1129885393"/>
       </p:ext>
     </p:extLst>
   </p:cSld>
@@ -870,7 +2550,7 @@
           <a:p>
             <a:fld id="{EF7662E3-674D-464C-A6F0-577B5998971D}" type="datetimeFigureOut">
               <a:rPr lang="en-US" smtClean="0"/>
-              <a:t>4/24/2015</a:t>
+              <a:t>4/24/15</a:t>
             </a:fld>
             <a:endParaRPr lang="en-US"/>
           </a:p>
@@ -1040,7 +2720,7 @@
           <a:p>
             <a:fld id="{EF7662E3-674D-464C-A6F0-577B5998971D}" type="datetimeFigureOut">
               <a:rPr lang="en-US" smtClean="0"/>
-              <a:t>4/24/2015</a:t>
+              <a:t>4/24/15</a:t>
             </a:fld>
             <a:endParaRPr lang="en-US"/>
           </a:p>
@@ -1220,7 +2900,7 @@
           <a:p>
             <a:fld id="{EF7662E3-674D-464C-A6F0-577B5998971D}" type="datetimeFigureOut">
               <a:rPr lang="en-US" smtClean="0"/>
-              <a:t>4/24/2015</a:t>
+              <a:t>4/24/15</a:t>
             </a:fld>
             <a:endParaRPr lang="en-US"/>
           </a:p>
@@ -1390,7 +3070,7 @@
           <a:p>
             <a:fld id="{EF7662E3-674D-464C-A6F0-577B5998971D}" type="datetimeFigureOut">
               <a:rPr lang="en-US" smtClean="0"/>
-              <a:t>4/24/2015</a:t>
+              <a:t>4/24/15</a:t>
             </a:fld>
             <a:endParaRPr lang="en-US"/>
           </a:p>
@@ -1636,7 +3316,7 @@
           <a:p>
             <a:fld id="{EF7662E3-674D-464C-A6F0-577B5998971D}" type="datetimeFigureOut">
               <a:rPr lang="en-US" smtClean="0"/>
-              <a:t>4/24/2015</a:t>
+              <a:t>4/24/15</a:t>
             </a:fld>
             <a:endParaRPr lang="en-US"/>
           </a:p>
@@ -1868,7 +3548,7 @@
           <a:p>
             <a:fld id="{EF7662E3-674D-464C-A6F0-577B5998971D}" type="datetimeFigureOut">
               <a:rPr lang="en-US" smtClean="0"/>
-              <a:t>4/24/2015</a:t>
+              <a:t>4/24/15</a:t>
             </a:fld>
             <a:endParaRPr lang="en-US"/>
           </a:p>
@@ -2235,7 +3915,7 @@
           <a:p>
             <a:fld id="{EF7662E3-674D-464C-A6F0-577B5998971D}" type="datetimeFigureOut">
               <a:rPr lang="en-US" smtClean="0"/>
-              <a:t>4/24/2015</a:t>
+              <a:t>4/24/15</a:t>
             </a:fld>
             <a:endParaRPr lang="en-US"/>
           </a:p>
@@ -2353,7 +4033,7 @@
           <a:p>
             <a:fld id="{EF7662E3-674D-464C-A6F0-577B5998971D}" type="datetimeFigureOut">
               <a:rPr lang="en-US" smtClean="0"/>
-              <a:t>4/24/2015</a:t>
+              <a:t>4/24/15</a:t>
             </a:fld>
             <a:endParaRPr lang="en-US"/>
           </a:p>
@@ -2448,7 +4128,7 @@
           <a:p>
             <a:fld id="{EF7662E3-674D-464C-A6F0-577B5998971D}" type="datetimeFigureOut">
               <a:rPr lang="en-US" smtClean="0"/>
-              <a:t>4/24/2015</a:t>
+              <a:t>4/24/15</a:t>
             </a:fld>
             <a:endParaRPr lang="en-US"/>
           </a:p>
@@ -2725,7 +4405,7 @@
           <a:p>
             <a:fld id="{EF7662E3-674D-464C-A6F0-577B5998971D}" type="datetimeFigureOut">
               <a:rPr lang="en-US" smtClean="0"/>
-              <a:t>4/24/2015</a:t>
+              <a:t>4/24/15</a:t>
             </a:fld>
             <a:endParaRPr lang="en-US"/>
           </a:p>
@@ -2978,7 +4658,7 @@
           <a:p>
             <a:fld id="{EF7662E3-674D-464C-A6F0-577B5998971D}" type="datetimeFigureOut">
               <a:rPr lang="en-US" smtClean="0"/>
-              <a:t>4/24/2015</a:t>
+              <a:t>4/24/15</a:t>
             </a:fld>
             <a:endParaRPr lang="en-US"/>
           </a:p>
@@ -3191,7 +4871,7 @@
           <a:p>
             <a:fld id="{EF7662E3-674D-464C-A6F0-577B5998971D}" type="datetimeFigureOut">
               <a:rPr lang="en-US" smtClean="0"/>
-              <a:t>4/24/2015</a:t>
+              <a:t>4/24/15</a:t>
             </a:fld>
             <a:endParaRPr lang="en-US"/>
           </a:p>
@@ -3783,6 +5463,36 @@
           </a:p>
         </p:txBody>
       </p:sp>
+      <p:sp>
+        <p:nvSpPr>
+          <p:cNvPr id="2" name="TextBox 1"/>
+          <p:cNvSpPr txBox="1"/>
+          <p:nvPr/>
+        </p:nvSpPr>
+        <p:spPr>
+          <a:xfrm>
+            <a:off x="5044239" y="4881209"/>
+            <a:ext cx="2103523" cy="523220"/>
+          </a:xfrm>
+          <a:prstGeom prst="rect">
+            <a:avLst/>
+          </a:prstGeom>
+          <a:noFill/>
+        </p:spPr>
+        <p:txBody>
+          <a:bodyPr wrap="square" rtlCol="0">
+            <a:spAutoFit/>
+          </a:bodyPr>
+          <a:lstStyle/>
+          <a:p>
+            <a:r>
+              <a:rPr lang="en-US" sz="2800" b="1" dirty="0" smtClean="0"/>
+              <a:t>Spring 2015</a:t>
+            </a:r>
+            <a:endParaRPr lang="en-US" sz="2800" b="1" dirty="0"/>
+          </a:p>
+        </p:txBody>
+      </p:sp>
     </p:spTree>
     <p:extLst>
       <p:ext uri="{BB962C8B-B14F-4D97-AF65-F5344CB8AC3E}">
@@ -3796,7 +5506,7 @@
   <p:timing>
     <p:tnLst>
       <p:par>
-        <p:cTn id="1" dur="indefinite" restart="never" nodeType="tmRoot"/>
+        <p:cTn xmlns:p14="http://schemas.microsoft.com/office/powerpoint/2010/main" id="1" dur="indefinite" restart="never" nodeType="tmRoot"/>
       </p:par>
     </p:tnLst>
   </p:timing>
@@ -3860,7 +5570,7 @@
           <p:nvPr/>
         </p:nvPicPr>
         <p:blipFill>
-          <a:blip r:embed="rId2">
+          <a:blip r:embed="rId3">
             <a:extLst>
               <a:ext uri="{28A0092B-C50C-407E-A947-70E740481C1C}">
                 <a14:useLocalDpi xmlns:a14="http://schemas.microsoft.com/office/drawing/2010/main" val="0"/>
@@ -3894,7 +5604,7 @@
   <p:timing>
     <p:tnLst>
       <p:par>
-        <p:cTn id="1" dur="indefinite" restart="never" nodeType="tmRoot"/>
+        <p:cTn xmlns:p14="http://schemas.microsoft.com/office/powerpoint/2010/main" id="1" dur="indefinite" restart="never" nodeType="tmRoot"/>
       </p:par>
     </p:tnLst>
   </p:timing>
@@ -3958,7 +5668,7 @@
           <p:nvPr/>
         </p:nvPicPr>
         <p:blipFill>
-          <a:blip r:embed="rId2">
+          <a:blip r:embed="rId3">
             <a:extLst>
               <a:ext uri="{28A0092B-C50C-407E-A947-70E740481C1C}">
                 <a14:useLocalDpi xmlns:a14="http://schemas.microsoft.com/office/drawing/2010/main" val="0"/>
@@ -3992,7 +5702,7 @@
   <p:timing>
     <p:tnLst>
       <p:par>
-        <p:cTn id="1" dur="indefinite" restart="never" nodeType="tmRoot"/>
+        <p:cTn xmlns:p14="http://schemas.microsoft.com/office/powerpoint/2010/main" id="1" dur="indefinite" restart="never" nodeType="tmRoot"/>
       </p:par>
     </p:tnLst>
   </p:timing>
@@ -4056,7 +5766,7 @@
           <p:nvPr/>
         </p:nvPicPr>
         <p:blipFill>
-          <a:blip r:embed="rId2">
+          <a:blip r:embed="rId3">
             <a:extLst>
               <a:ext uri="{28A0092B-C50C-407E-A947-70E740481C1C}">
                 <a14:useLocalDpi xmlns:a14="http://schemas.microsoft.com/office/drawing/2010/main" val="0"/>
@@ -4090,7 +5800,7 @@
   <p:timing>
     <p:tnLst>
       <p:par>
-        <p:cTn id="1" dur="indefinite" restart="never" nodeType="tmRoot"/>
+        <p:cTn xmlns:p14="http://schemas.microsoft.com/office/powerpoint/2010/main" id="1" dur="indefinite" restart="never" nodeType="tmRoot"/>
       </p:par>
     </p:tnLst>
   </p:timing>
@@ -4154,7 +5864,7 @@
           <p:nvPr/>
         </p:nvPicPr>
         <p:blipFill>
-          <a:blip r:embed="rId2">
+          <a:blip r:embed="rId3">
             <a:extLst>
               <a:ext uri="{28A0092B-C50C-407E-A947-70E740481C1C}">
                 <a14:useLocalDpi xmlns:a14="http://schemas.microsoft.com/office/drawing/2010/main" val="0"/>
@@ -4188,7 +5898,7 @@
   <p:timing>
     <p:tnLst>
       <p:par>
-        <p:cTn id="1" dur="indefinite" restart="never" nodeType="tmRoot"/>
+        <p:cTn xmlns:p14="http://schemas.microsoft.com/office/powerpoint/2010/main" id="1" dur="indefinite" restart="never" nodeType="tmRoot"/>
       </p:par>
     </p:tnLst>
   </p:timing>
@@ -4934,7 +6644,7 @@
   <p:timing>
     <p:tnLst>
       <p:par>
-        <p:cTn id="1" dur="indefinite" restart="never" nodeType="tmRoot"/>
+        <p:cTn xmlns:p14="http://schemas.microsoft.com/office/powerpoint/2010/main" id="1" dur="indefinite" restart="never" nodeType="tmRoot"/>
       </p:par>
     </p:tnLst>
   </p:timing>
@@ -4997,7 +6707,7 @@
           <p:nvPr/>
         </p:nvPicPr>
         <p:blipFill>
-          <a:blip r:embed="rId2">
+          <a:blip r:embed="rId3">
             <a:extLst>
               <a:ext uri="{28A0092B-C50C-407E-A947-70E740481C1C}">
                 <a14:useLocalDpi xmlns:a14="http://schemas.microsoft.com/office/drawing/2010/main" val="0"/>
@@ -5031,7 +6741,7 @@
   <p:timing>
     <p:tnLst>
       <p:par>
-        <p:cTn id="1" dur="indefinite" restart="never" nodeType="tmRoot"/>
+        <p:cTn xmlns:p14="http://schemas.microsoft.com/office/powerpoint/2010/main" id="1" dur="indefinite" restart="never" nodeType="tmRoot"/>
       </p:par>
     </p:tnLst>
   </p:timing>
@@ -5175,7 +6885,7 @@
   <p:timing>
     <p:tnLst>
       <p:par>
-        <p:cTn id="1" dur="indefinite" restart="never" nodeType="tmRoot"/>
+        <p:cTn xmlns:p14="http://schemas.microsoft.com/office/powerpoint/2010/main" id="1" dur="indefinite" restart="never" nodeType="tmRoot"/>
       </p:par>
     </p:tnLst>
   </p:timing>
@@ -5239,7 +6949,7 @@
           <p:nvPr/>
         </p:nvPicPr>
         <p:blipFill>
-          <a:blip r:embed="rId2">
+          <a:blip r:embed="rId3">
             <a:extLst>
               <a:ext uri="{28A0092B-C50C-407E-A947-70E740481C1C}">
                 <a14:useLocalDpi xmlns:a14="http://schemas.microsoft.com/office/drawing/2010/main" val="0"/>
@@ -5273,7 +6983,7 @@
   <p:timing>
     <p:tnLst>
       <p:par>
-        <p:cTn id="1" dur="indefinite" restart="never" nodeType="tmRoot"/>
+        <p:cTn xmlns:p14="http://schemas.microsoft.com/office/powerpoint/2010/main" id="1" dur="indefinite" restart="never" nodeType="tmRoot"/>
       </p:par>
     </p:tnLst>
   </p:timing>
@@ -5337,7 +7047,7 @@
           <p:nvPr/>
         </p:nvPicPr>
         <p:blipFill>
-          <a:blip r:embed="rId2">
+          <a:blip r:embed="rId3">
             <a:extLst>
               <a:ext uri="{28A0092B-C50C-407E-A947-70E740481C1C}">
                 <a14:useLocalDpi xmlns:a14="http://schemas.microsoft.com/office/drawing/2010/main" val="0"/>
@@ -5371,7 +7081,7 @@
   <p:timing>
     <p:tnLst>
       <p:par>
-        <p:cTn id="1" dur="indefinite" restart="never" nodeType="tmRoot"/>
+        <p:cTn xmlns:p14="http://schemas.microsoft.com/office/powerpoint/2010/main" id="1" dur="indefinite" restart="never" nodeType="tmRoot"/>
       </p:par>
     </p:tnLst>
   </p:timing>
@@ -5435,7 +7145,7 @@
           <p:nvPr/>
         </p:nvPicPr>
         <p:blipFill>
-          <a:blip r:embed="rId2">
+          <a:blip r:embed="rId3">
             <a:extLst>
               <a:ext uri="{28A0092B-C50C-407E-A947-70E740481C1C}">
                 <a14:useLocalDpi xmlns:a14="http://schemas.microsoft.com/office/drawing/2010/main" val="0"/>
@@ -5469,7 +7179,7 @@
   <p:timing>
     <p:tnLst>
       <p:par>
-        <p:cTn id="1" dur="indefinite" restart="never" nodeType="tmRoot"/>
+        <p:cTn xmlns:p14="http://schemas.microsoft.com/office/powerpoint/2010/main" id="1" dur="indefinite" restart="never" nodeType="tmRoot"/>
       </p:par>
     </p:tnLst>
   </p:timing>
@@ -5535,7 +7245,7 @@
         <p:spPr bwMode="auto">
           <a:xfrm>
             <a:off x="340425" y="1274618"/>
-            <a:ext cx="11523023" cy="5016758"/>
+            <a:ext cx="11523023" cy="4462760"/>
           </a:xfrm>
           <a:prstGeom prst="rect">
             <a:avLst/>
@@ -5545,14 +7255,14 @@
             <a:noFill/>
           </a:ln>
           <a:extLst>
-            <a:ext uri="{909E8E84-426E-40DD-AFC4-6F175D3DCCD1}">
+            <a:ext uri="{909E8E84-426E-40dd-AFC4-6F175D3DCCD1}">
               <a14:hiddenFill xmlns:a14="http://schemas.microsoft.com/office/drawing/2010/main">
                 <a:solidFill>
                   <a:srgbClr val="FFFFFF"/>
                 </a:solidFill>
               </a14:hiddenFill>
             </a:ext>
-            <a:ext uri="{91240B29-F687-4F45-9708-019B960494DF}">
+            <a:ext uri="{91240B29-F687-4f45-9708-019B960494DF}">
               <a14:hiddenLine xmlns:a14="http://schemas.microsoft.com/office/drawing/2010/main" w="9525">
                 <a:solidFill>
                   <a:srgbClr val="000000"/>
@@ -5680,72 +7390,101 @@
               <a:buFont typeface="Arial" panose="020B0604020202020204" pitchFamily="34" charset="0"/>
               <a:buChar char="•"/>
             </a:pPr>
-            <a:r>
-              <a:rPr lang="en-US" altLang="en-US" sz="3200" dirty="0"/>
-              <a:t>Current students lack a reliable source for answering questions related to their classes or </a:t>
-            </a:r>
-            <a:r>
-              <a:rPr lang="en-US" altLang="en-US" sz="3200" dirty="0" smtClean="0"/>
-              <a:t>projects.</a:t>
-            </a:r>
+            <a:endParaRPr lang="en-US" altLang="en-US" sz="3200" dirty="0" smtClean="0"/>
           </a:p>
           <a:p>
             <a:pPr marL="571500" indent="-571500" algn="just" eaLnBrk="1" hangingPunct="1">
               <a:buFont typeface="Arial" panose="020B0604020202020204" pitchFamily="34" charset="0"/>
               <a:buChar char="•"/>
             </a:pPr>
-            <a:endParaRPr lang="en-US" altLang="en-US" sz="3200" dirty="0" smtClean="0"/>
+            <a:r>
+              <a:rPr lang="en-US" altLang="en-US" sz="2800" dirty="0" smtClean="0"/>
+              <a:t>Current </a:t>
+            </a:r>
+            <a:r>
+              <a:rPr lang="en-US" altLang="en-US" sz="2800" dirty="0"/>
+              <a:t>students lack a reliable source for answering questions related to their classes or </a:t>
+            </a:r>
+            <a:r>
+              <a:rPr lang="en-US" altLang="en-US" sz="2800" dirty="0" smtClean="0"/>
+              <a:t>projects</a:t>
+            </a:r>
+            <a:r>
+              <a:rPr lang="en-US" altLang="en-US" sz="2800" dirty="0" smtClean="0"/>
+              <a:t>.</a:t>
+            </a:r>
+            <a:endParaRPr lang="en-US" altLang="en-US" sz="2800" dirty="0" smtClean="0"/>
           </a:p>
           <a:p>
             <a:pPr marL="571500" indent="-571500" algn="just" eaLnBrk="1" hangingPunct="1">
               <a:buFont typeface="Arial" panose="020B0604020202020204" pitchFamily="34" charset="0"/>
               <a:buChar char="•"/>
             </a:pPr>
-            <a:r>
-              <a:rPr lang="en-US" altLang="en-US" sz="3200" dirty="0" smtClean="0"/>
-              <a:t>Students </a:t>
-            </a:r>
-            <a:r>
-              <a:rPr lang="en-US" altLang="en-US" sz="3200" dirty="0"/>
-              <a:t>may rely on several internet sources, often unreliable, inaccurate and incomplete</a:t>
-            </a:r>
-            <a:r>
-              <a:rPr lang="en-US" altLang="en-US" sz="3200" dirty="0" smtClean="0"/>
-              <a:t>. </a:t>
-            </a:r>
+            <a:endParaRPr lang="en-US" altLang="en-US" sz="2800" dirty="0" smtClean="0"/>
           </a:p>
           <a:p>
             <a:pPr marL="571500" indent="-571500" algn="just" eaLnBrk="1" hangingPunct="1">
               <a:buFont typeface="Arial" panose="020B0604020202020204" pitchFamily="34" charset="0"/>
               <a:buChar char="•"/>
             </a:pPr>
-            <a:endParaRPr lang="en-US" altLang="en-US" sz="3200" dirty="0" smtClean="0"/>
+            <a:r>
+              <a:rPr lang="en-US" altLang="en-US" sz="2800" dirty="0" smtClean="0"/>
+              <a:t>Students </a:t>
+            </a:r>
+            <a:r>
+              <a:rPr lang="en-US" altLang="en-US" sz="2800" dirty="0"/>
+              <a:t>may rely on several internet sources, often unreliable, inaccurate and incomplete</a:t>
+            </a:r>
+            <a:r>
+              <a:rPr lang="en-US" altLang="en-US" sz="2800" dirty="0" smtClean="0"/>
+              <a:t>. </a:t>
+            </a:r>
           </a:p>
           <a:p>
             <a:pPr marL="571500" indent="-571500" algn="just" eaLnBrk="1" hangingPunct="1">
               <a:buFont typeface="Arial" panose="020B0604020202020204" pitchFamily="34" charset="0"/>
               <a:buChar char="•"/>
             </a:pPr>
-            <a:r>
-              <a:rPr lang="en-US" altLang="en-US" sz="3200" dirty="0" smtClean="0"/>
-              <a:t>Difficulty matching the correct mentor to the right question.</a:t>
-            </a:r>
+            <a:endParaRPr lang="en-US" altLang="en-US" sz="2800" dirty="0" smtClean="0"/>
           </a:p>
           <a:p>
             <a:pPr marL="571500" indent="-571500" algn="just" eaLnBrk="1" hangingPunct="1">
               <a:buFont typeface="Arial" panose="020B0604020202020204" pitchFamily="34" charset="0"/>
               <a:buChar char="•"/>
             </a:pPr>
-            <a:endParaRPr lang="en-US" altLang="en-US" sz="3200" dirty="0" smtClean="0"/>
+            <a:r>
+              <a:rPr lang="en-US" altLang="en-US" sz="2800" dirty="0" smtClean="0"/>
+              <a:t>Difficulty </a:t>
+            </a:r>
+            <a:r>
+              <a:rPr lang="en-US" altLang="en-US" sz="2800" dirty="0" smtClean="0"/>
+              <a:t>matching the correct mentor to the right question</a:t>
+            </a:r>
+            <a:r>
+              <a:rPr lang="en-US" altLang="en-US" sz="2800" dirty="0" smtClean="0"/>
+              <a:t>.</a:t>
+            </a:r>
+            <a:endParaRPr lang="en-US" altLang="en-US" sz="2800" dirty="0" smtClean="0"/>
           </a:p>
           <a:p>
             <a:pPr marL="571500" indent="-571500" algn="just" eaLnBrk="1" hangingPunct="1">
               <a:buFont typeface="Arial" panose="020B0604020202020204" pitchFamily="34" charset="0"/>
               <a:buChar char="•"/>
             </a:pPr>
-            <a:r>
-              <a:rPr lang="en-US" altLang="en-US" sz="3200" dirty="0" smtClean="0"/>
-              <a:t>Lack of standard way of communication for answering questions.</a:t>
+            <a:endParaRPr lang="en-US" altLang="en-US" sz="2800" dirty="0" smtClean="0"/>
+          </a:p>
+          <a:p>
+            <a:pPr marL="571500" indent="-571500" algn="just" eaLnBrk="1" hangingPunct="1">
+              <a:buFont typeface="Arial" panose="020B0604020202020204" pitchFamily="34" charset="0"/>
+              <a:buChar char="•"/>
+            </a:pPr>
+            <a:r>
+              <a:rPr lang="en-US" altLang="en-US" sz="2800" dirty="0" smtClean="0"/>
+              <a:t>Lack </a:t>
+            </a:r>
+            <a:r>
+              <a:rPr lang="en-US" altLang="en-US" sz="2800" dirty="0" smtClean="0"/>
+              <a:t>of standard way of communication for answering questions.</a:t>
             </a:r>
           </a:p>
         </p:txBody>
@@ -5763,7 +7502,7 @@
   <p:timing>
     <p:tnLst>
       <p:par>
-        <p:cTn id="1" dur="indefinite" restart="never" nodeType="tmRoot"/>
+        <p:cTn xmlns:p14="http://schemas.microsoft.com/office/powerpoint/2010/main" id="1" dur="indefinite" restart="never" nodeType="tmRoot"/>
       </p:par>
     </p:tnLst>
   </p:timing>
@@ -6308,7 +8047,7 @@
   <p:timing>
     <p:tnLst>
       <p:par>
-        <p:cTn id="1" dur="indefinite" restart="never" nodeType="tmRoot"/>
+        <p:cTn xmlns:p14="http://schemas.microsoft.com/office/powerpoint/2010/main" id="1" dur="indefinite" restart="never" nodeType="tmRoot"/>
       </p:par>
     </p:tnLst>
   </p:timing>
@@ -7244,7 +8983,7 @@
   <p:timing>
     <p:tnLst>
       <p:par>
-        <p:cTn id="1" dur="indefinite" restart="never" nodeType="tmRoot"/>
+        <p:cTn xmlns:p14="http://schemas.microsoft.com/office/powerpoint/2010/main" id="1" dur="indefinite" restart="never" nodeType="tmRoot"/>
       </p:par>
     </p:tnLst>
   </p:timing>
@@ -8327,7 +10066,7 @@
   <p:timing>
     <p:tnLst>
       <p:par>
-        <p:cTn id="1" dur="indefinite" restart="never" nodeType="tmRoot"/>
+        <p:cTn xmlns:p14="http://schemas.microsoft.com/office/powerpoint/2010/main" id="1" dur="indefinite" restart="never" nodeType="tmRoot"/>
       </p:par>
     </p:tnLst>
   </p:timing>
@@ -8406,7 +10145,7 @@
           <a:p>
             <a:r>
               <a:rPr lang="en-US" sz="3600" b="1" dirty="0">
-                <a:hlinkClick r:id="rId2"/>
+                <a:hlinkClick r:id="rId3"/>
               </a:rPr>
               <a:t>http://cp-dev.cis.fiu.edu/coplat/index.php/site/login</a:t>
             </a:r>
@@ -8427,7 +10166,7 @@
   <p:timing>
     <p:tnLst>
       <p:par>
-        <p:cTn id="1" dur="indefinite" restart="never" nodeType="tmRoot"/>
+        <p:cTn xmlns:p14="http://schemas.microsoft.com/office/powerpoint/2010/main" id="1" dur="indefinite" restart="never" nodeType="tmRoot"/>
       </p:par>
     </p:tnLst>
   </p:timing>
@@ -8459,8 +10198,8 @@
         </p:nvSpPr>
         <p:spPr>
           <a:xfrm>
-            <a:off x="2080186" y="250551"/>
-            <a:ext cx="8310929" cy="923330"/>
+            <a:off x="1927308" y="250551"/>
+            <a:ext cx="8616699" cy="923330"/>
           </a:xfrm>
           <a:prstGeom prst="rect">
             <a:avLst/>
@@ -8476,15 +10215,7 @@
             <a:pPr algn="ctr"/>
             <a:r>
               <a:rPr lang="en-US" sz="5400" b="1" dirty="0" smtClean="0"/>
-              <a:t>Previous </a:t>
-            </a:r>
-            <a:r>
-              <a:rPr lang="en-US" sz="5400" b="1" dirty="0"/>
-              <a:t>V</a:t>
-            </a:r>
-            <a:r>
-              <a:rPr lang="en-US" sz="5400" b="1" dirty="0" smtClean="0"/>
-              <a:t>ersion Limitations</a:t>
+              <a:t>Problem                       Solution</a:t>
             </a:r>
             <a:endParaRPr lang="en-US" sz="5400" b="1" dirty="0"/>
           </a:p>
@@ -8500,8 +10231,8 @@
         </p:nvSpPr>
         <p:spPr bwMode="auto">
           <a:xfrm>
-            <a:off x="340425" y="1684326"/>
-            <a:ext cx="11523023" cy="5078313"/>
+            <a:off x="380114" y="1902592"/>
+            <a:ext cx="4977915" cy="3908762"/>
           </a:xfrm>
           <a:prstGeom prst="rect">
             <a:avLst/>
@@ -8511,14 +10242,14 @@
             <a:noFill/>
           </a:ln>
           <a:extLst>
-            <a:ext uri="{909E8E84-426E-40DD-AFC4-6F175D3DCCD1}">
+            <a:ext uri="{909E8E84-426E-40dd-AFC4-6F175D3DCCD1}">
               <a14:hiddenFill xmlns:a14="http://schemas.microsoft.com/office/drawing/2010/main">
                 <a:solidFill>
                   <a:srgbClr val="FFFFFF"/>
                 </a:solidFill>
               </a14:hiddenFill>
             </a:ext>
-            <a:ext uri="{91240B29-F687-4F45-9708-019B960494DF}">
+            <a:ext uri="{91240B29-F687-4f45-9708-019B960494DF}">
               <a14:hiddenLine xmlns:a14="http://schemas.microsoft.com/office/drawing/2010/main" w="9525">
                 <a:solidFill>
                   <a:srgbClr val="000000"/>
@@ -8647,40 +10378,213 @@
               <a:buChar char="•"/>
             </a:pPr>
             <a:r>
-              <a:rPr lang="en-US" sz="3600" dirty="0" smtClean="0"/>
+              <a:rPr lang="en-US" sz="2800" dirty="0" smtClean="0"/>
               <a:t>Lack of interaction </a:t>
             </a:r>
             <a:r>
-              <a:rPr lang="en-US" sz="3600" dirty="0"/>
+              <a:rPr lang="en-US" sz="2800" dirty="0"/>
               <a:t>among users of the </a:t>
             </a:r>
             <a:r>
-              <a:rPr lang="en-US" sz="3600" dirty="0" smtClean="0"/>
+              <a:rPr lang="en-US" sz="2800" dirty="0" smtClean="0"/>
               <a:t>system</a:t>
             </a:r>
+            <a:endParaRPr lang="en-US" sz="2800" dirty="0"/>
           </a:p>
           <a:p>
             <a:pPr marL="1028700" lvl="1" indent="-571500">
               <a:buFont typeface="Arial" panose="020B0604020202020204" pitchFamily="34" charset="0"/>
               <a:buChar char="•"/>
             </a:pPr>
-            <a:endParaRPr lang="en-US" sz="3600" dirty="0"/>
+            <a:r>
+              <a:rPr lang="en-US" sz="2800" dirty="0" smtClean="0"/>
+              <a:t>Very difficult to set up </a:t>
+            </a:r>
+            <a:r>
+              <a:rPr lang="en-US" sz="2800" dirty="0" smtClean="0"/>
+              <a:t>meetings</a:t>
+            </a:r>
+            <a:endParaRPr lang="en-US" sz="2800" dirty="0" smtClean="0"/>
           </a:p>
           <a:p>
             <a:pPr marL="1028700" lvl="1" indent="-571500">
               <a:buFont typeface="Arial" panose="020B0604020202020204" pitchFamily="34" charset="0"/>
               <a:buChar char="•"/>
             </a:pPr>
-            <a:endParaRPr lang="en-US" sz="3600" dirty="0"/>
-          </a:p>
+            <a:r>
+              <a:rPr lang="en-US" sz="2800" dirty="0" smtClean="0"/>
+              <a:t>Lack of reporting to measure the utilization of the system</a:t>
+            </a:r>
+            <a:endParaRPr lang="en-US" sz="2800" dirty="0"/>
+          </a:p>
+          <a:p>
+            <a:pPr marL="571500" indent="-571500" algn="just" eaLnBrk="1" hangingPunct="1">
+              <a:buFont typeface="Arial" panose="020B0604020202020204" pitchFamily="34" charset="0"/>
+              <a:buChar char="•"/>
+            </a:pPr>
+            <a:endParaRPr lang="en-US" altLang="en-US" sz="2400" dirty="0" smtClean="0"/>
+          </a:p>
+        </p:txBody>
+      </p:sp>
+      <p:sp>
+        <p:nvSpPr>
+          <p:cNvPr id="4" name="TextBox 12"/>
+          <p:cNvSpPr txBox="1">
+            <a:spLocks noChangeArrowheads="1"/>
+          </p:cNvSpPr>
+          <p:nvPr/>
+        </p:nvSpPr>
+        <p:spPr bwMode="auto">
+          <a:xfrm>
+            <a:off x="6188213" y="1896253"/>
+            <a:ext cx="4977915" cy="2616101"/>
+          </a:xfrm>
+          <a:prstGeom prst="rect">
+            <a:avLst/>
+          </a:prstGeom>
+          <a:noFill/>
+          <a:ln>
+            <a:noFill/>
+          </a:ln>
+          <a:extLst>
+            <a:ext uri="{909E8E84-426E-40dd-AFC4-6F175D3DCCD1}">
+              <a14:hiddenFill xmlns:a14="http://schemas.microsoft.com/office/drawing/2010/main">
+                <a:solidFill>
+                  <a:srgbClr val="FFFFFF"/>
+                </a:solidFill>
+              </a14:hiddenFill>
+            </a:ext>
+            <a:ext uri="{91240B29-F687-4f45-9708-019B960494DF}">
+              <a14:hiddenLine xmlns:a14="http://schemas.microsoft.com/office/drawing/2010/main" w="9525">
+                <a:solidFill>
+                  <a:srgbClr val="000000"/>
+                </a:solidFill>
+                <a:miter lim="800000"/>
+                <a:headEnd/>
+                <a:tailEnd/>
+              </a14:hiddenLine>
+            </a:ext>
+          </a:extLst>
+        </p:spPr>
+        <p:txBody>
+          <a:bodyPr wrap="square">
+            <a:spAutoFit/>
+          </a:bodyPr>
+          <a:lstStyle>
+            <a:lvl1pPr>
+              <a:defRPr sz="8400">
+                <a:solidFill>
+                  <a:schemeClr val="tx1"/>
+                </a:solidFill>
+                <a:latin typeface="Arial" panose="020B0604020202020204" pitchFamily="34" charset="0"/>
+                <a:ea typeface="ＭＳ Ｐゴシック" panose="020B0600070205080204" pitchFamily="34" charset="-128"/>
+              </a:defRPr>
+            </a:lvl1pPr>
+            <a:lvl2pPr marL="742950" indent="-285750">
+              <a:defRPr sz="8400">
+                <a:solidFill>
+                  <a:schemeClr val="tx1"/>
+                </a:solidFill>
+                <a:latin typeface="Arial" panose="020B0604020202020204" pitchFamily="34" charset="0"/>
+                <a:ea typeface="ＭＳ Ｐゴシック" panose="020B0600070205080204" pitchFamily="34" charset="-128"/>
+              </a:defRPr>
+            </a:lvl2pPr>
+            <a:lvl3pPr marL="1143000" indent="-228600">
+              <a:defRPr sz="8400">
+                <a:solidFill>
+                  <a:schemeClr val="tx1"/>
+                </a:solidFill>
+                <a:latin typeface="Arial" panose="020B0604020202020204" pitchFamily="34" charset="0"/>
+                <a:ea typeface="ＭＳ Ｐゴシック" panose="020B0600070205080204" pitchFamily="34" charset="-128"/>
+              </a:defRPr>
+            </a:lvl3pPr>
+            <a:lvl4pPr marL="1600200" indent="-228600">
+              <a:defRPr sz="8400">
+                <a:solidFill>
+                  <a:schemeClr val="tx1"/>
+                </a:solidFill>
+                <a:latin typeface="Arial" panose="020B0604020202020204" pitchFamily="34" charset="0"/>
+                <a:ea typeface="ＭＳ Ｐゴシック" panose="020B0600070205080204" pitchFamily="34" charset="-128"/>
+              </a:defRPr>
+            </a:lvl4pPr>
+            <a:lvl5pPr marL="2057400" indent="-228600">
+              <a:defRPr sz="8400">
+                <a:solidFill>
+                  <a:schemeClr val="tx1"/>
+                </a:solidFill>
+                <a:latin typeface="Arial" panose="020B0604020202020204" pitchFamily="34" charset="0"/>
+                <a:ea typeface="ＭＳ Ｐゴシック" panose="020B0600070205080204" pitchFamily="34" charset="-128"/>
+              </a:defRPr>
+            </a:lvl5pPr>
+            <a:lvl6pPr marL="2514600" indent="-228600" eaLnBrk="0" fontAlgn="base" hangingPunct="0">
+              <a:spcBef>
+                <a:spcPct val="0"/>
+              </a:spcBef>
+              <a:spcAft>
+                <a:spcPct val="0"/>
+              </a:spcAft>
+              <a:defRPr sz="8400">
+                <a:solidFill>
+                  <a:schemeClr val="tx1"/>
+                </a:solidFill>
+                <a:latin typeface="Arial" panose="020B0604020202020204" pitchFamily="34" charset="0"/>
+                <a:ea typeface="ＭＳ Ｐゴシック" panose="020B0600070205080204" pitchFamily="34" charset="-128"/>
+              </a:defRPr>
+            </a:lvl6pPr>
+            <a:lvl7pPr marL="2971800" indent="-228600" eaLnBrk="0" fontAlgn="base" hangingPunct="0">
+              <a:spcBef>
+                <a:spcPct val="0"/>
+              </a:spcBef>
+              <a:spcAft>
+                <a:spcPct val="0"/>
+              </a:spcAft>
+              <a:defRPr sz="8400">
+                <a:solidFill>
+                  <a:schemeClr val="tx1"/>
+                </a:solidFill>
+                <a:latin typeface="Arial" panose="020B0604020202020204" pitchFamily="34" charset="0"/>
+                <a:ea typeface="ＭＳ Ｐゴシック" panose="020B0600070205080204" pitchFamily="34" charset="-128"/>
+              </a:defRPr>
+            </a:lvl7pPr>
+            <a:lvl8pPr marL="3429000" indent="-228600" eaLnBrk="0" fontAlgn="base" hangingPunct="0">
+              <a:spcBef>
+                <a:spcPct val="0"/>
+              </a:spcBef>
+              <a:spcAft>
+                <a:spcPct val="0"/>
+              </a:spcAft>
+              <a:defRPr sz="8400">
+                <a:solidFill>
+                  <a:schemeClr val="tx1"/>
+                </a:solidFill>
+                <a:latin typeface="Arial" panose="020B0604020202020204" pitchFamily="34" charset="0"/>
+                <a:ea typeface="ＭＳ Ｐゴシック" panose="020B0600070205080204" pitchFamily="34" charset="-128"/>
+              </a:defRPr>
+            </a:lvl8pPr>
+            <a:lvl9pPr marL="3886200" indent="-228600" eaLnBrk="0" fontAlgn="base" hangingPunct="0">
+              <a:spcBef>
+                <a:spcPct val="0"/>
+              </a:spcBef>
+              <a:spcAft>
+                <a:spcPct val="0"/>
+              </a:spcAft>
+              <a:defRPr sz="8400">
+                <a:solidFill>
+                  <a:schemeClr val="tx1"/>
+                </a:solidFill>
+                <a:latin typeface="Arial" panose="020B0604020202020204" pitchFamily="34" charset="0"/>
+                <a:ea typeface="ＭＳ Ｐゴシック" panose="020B0600070205080204" pitchFamily="34" charset="-128"/>
+              </a:defRPr>
+            </a:lvl9pPr>
+          </a:lstStyle>
           <a:p>
             <a:pPr marL="1028700" lvl="1" indent="-571500">
               <a:buFont typeface="Arial" panose="020B0604020202020204" pitchFamily="34" charset="0"/>
               <a:buChar char="•"/>
             </a:pPr>
             <a:r>
-              <a:rPr lang="en-US" sz="3600" dirty="0" smtClean="0"/>
-              <a:t>Very difficult to set up meetings</a:t>
+              <a:rPr lang="en-US" sz="2800" dirty="0" smtClean="0"/>
+              <a:t>Collaborative Tools</a:t>
             </a:r>
           </a:p>
           <a:p>
@@ -8688,32 +10592,45 @@
               <a:buFont typeface="Arial" panose="020B0604020202020204" pitchFamily="34" charset="0"/>
               <a:buChar char="•"/>
             </a:pPr>
-            <a:endParaRPr lang="en-US" sz="3600" dirty="0"/>
+            <a:endParaRPr lang="en-US" sz="2800" dirty="0"/>
           </a:p>
           <a:p>
             <a:pPr marL="1028700" lvl="1" indent="-571500">
               <a:buFont typeface="Arial" panose="020B0604020202020204" pitchFamily="34" charset="0"/>
               <a:buChar char="•"/>
             </a:pPr>
-            <a:endParaRPr lang="en-US" sz="3600" dirty="0" smtClean="0"/>
+            <a:r>
+              <a:rPr lang="en-US" sz="2800" dirty="0" smtClean="0"/>
+              <a:t>Admin Reports</a:t>
+            </a:r>
           </a:p>
           <a:p>
             <a:pPr marL="1028700" lvl="1" indent="-571500">
               <a:buFont typeface="Arial" panose="020B0604020202020204" pitchFamily="34" charset="0"/>
               <a:buChar char="•"/>
             </a:pPr>
-            <a:r>
-              <a:rPr lang="en-US" sz="3600" dirty="0" smtClean="0"/>
-              <a:t>Lack of reporting to measure the utilization of the system</a:t>
-            </a:r>
-            <a:endParaRPr lang="en-US" sz="3600" dirty="0"/>
+            <a:endParaRPr lang="en-US" sz="2800" dirty="0" smtClean="0"/>
+          </a:p>
+          <a:p>
+            <a:pPr marL="1028700" lvl="1" indent="-571500">
+              <a:buFont typeface="Arial" panose="020B0604020202020204" pitchFamily="34" charset="0"/>
+              <a:buChar char="•"/>
+            </a:pPr>
+            <a:r>
+              <a:rPr lang="en-US" sz="2800" dirty="0" smtClean="0"/>
+              <a:t>Utilization Dashboard</a:t>
+            </a:r>
+            <a:r>
+              <a:rPr lang="en-US" sz="2800" dirty="0" smtClean="0"/>
+              <a:t> </a:t>
+            </a:r>
           </a:p>
           <a:p>
             <a:pPr marL="571500" indent="-571500" algn="just" eaLnBrk="1" hangingPunct="1">
               <a:buFont typeface="Arial" panose="020B0604020202020204" pitchFamily="34" charset="0"/>
               <a:buChar char="•"/>
             </a:pPr>
-            <a:endParaRPr lang="en-US" altLang="en-US" sz="3600" dirty="0" smtClean="0"/>
+            <a:endParaRPr lang="en-US" altLang="en-US" sz="2400" dirty="0" smtClean="0"/>
           </a:p>
         </p:txBody>
       </p:sp>
@@ -8730,7 +10647,7 @@
   <p:timing>
     <p:tnLst>
       <p:par>
-        <p:cTn id="1" dur="indefinite" restart="never" nodeType="tmRoot"/>
+        <p:cTn xmlns:p14="http://schemas.microsoft.com/office/powerpoint/2010/main" id="1" dur="indefinite" restart="never" nodeType="tmRoot"/>
       </p:par>
     </p:tnLst>
   </p:timing>
@@ -8763,7 +10680,7 @@
           <p:nvPr/>
         </p:nvPicPr>
         <p:blipFill>
-          <a:blip r:embed="rId2">
+          <a:blip r:embed="rId3">
             <a:extLst>
               <a:ext uri="{28A0092B-C50C-407E-A947-70E740481C1C}">
                 <a14:useLocalDpi xmlns:a14="http://schemas.microsoft.com/office/drawing/2010/main" val="0"/>
@@ -8828,7 +10745,7 @@
   <p:timing>
     <p:tnLst>
       <p:par>
-        <p:cTn id="1" dur="indefinite" restart="never" nodeType="tmRoot"/>
+        <p:cTn xmlns:p14="http://schemas.microsoft.com/office/powerpoint/2010/main" id="1" dur="indefinite" restart="never" nodeType="tmRoot"/>
       </p:par>
     </p:tnLst>
   </p:timing>
@@ -9320,7 +11237,7 @@
   <p:timing>
     <p:tnLst>
       <p:par>
-        <p:cTn id="1" dur="indefinite" restart="never" nodeType="tmRoot"/>
+        <p:cTn xmlns:p14="http://schemas.microsoft.com/office/powerpoint/2010/main" id="1" dur="indefinite" restart="never" nodeType="tmRoot"/>
       </p:par>
     </p:tnLst>
   </p:timing>
@@ -10139,7 +12056,7 @@
   <p:timing>
     <p:tnLst>
       <p:par>
-        <p:cTn id="1" dur="indefinite" restart="never" nodeType="tmRoot"/>
+        <p:cTn xmlns:p14="http://schemas.microsoft.com/office/powerpoint/2010/main" id="1" dur="indefinite" restart="never" nodeType="tmRoot"/>
       </p:par>
     </p:tnLst>
   </p:timing>
@@ -10203,7 +12120,7 @@
           <p:nvPr/>
         </p:nvPicPr>
         <p:blipFill>
-          <a:blip r:embed="rId2">
+          <a:blip r:embed="rId3">
             <a:extLst>
               <a:ext uri="{28A0092B-C50C-407E-A947-70E740481C1C}">
                 <a14:useLocalDpi xmlns:a14="http://schemas.microsoft.com/office/drawing/2010/main" val="0"/>
@@ -10237,7 +12154,7 @@
   <p:timing>
     <p:tnLst>
       <p:par>
-        <p:cTn id="1" dur="indefinite" restart="never" nodeType="tmRoot"/>
+        <p:cTn xmlns:p14="http://schemas.microsoft.com/office/powerpoint/2010/main" id="1" dur="indefinite" restart="never" nodeType="tmRoot"/>
       </p:par>
     </p:tnLst>
   </p:timing>
@@ -10301,7 +12218,7 @@
           <p:nvPr/>
         </p:nvPicPr>
         <p:blipFill>
-          <a:blip r:embed="rId2">
+          <a:blip r:embed="rId3">
             <a:extLst>
               <a:ext uri="{28A0092B-C50C-407E-A947-70E740481C1C}">
                 <a14:useLocalDpi xmlns:a14="http://schemas.microsoft.com/office/drawing/2010/main" val="0"/>
@@ -10331,7 +12248,7 @@
           <p:nvPr/>
         </p:nvPicPr>
         <p:blipFill>
-          <a:blip r:embed="rId3">
+          <a:blip r:embed="rId4">
             <a:extLst>
               <a:ext uri="{28A0092B-C50C-407E-A947-70E740481C1C}">
                 <a14:useLocalDpi xmlns:a14="http://schemas.microsoft.com/office/drawing/2010/main" val="0"/>
@@ -10365,7 +12282,7 @@
   <p:timing>
     <p:tnLst>
       <p:par>
-        <p:cTn id="1" dur="indefinite" restart="never" nodeType="tmRoot"/>
+        <p:cTn xmlns:p14="http://schemas.microsoft.com/office/powerpoint/2010/main" id="1" dur="indefinite" restart="never" nodeType="tmRoot"/>
       </p:par>
     </p:tnLst>
   </p:timing>
@@ -10429,7 +12346,7 @@
           <p:nvPr/>
         </p:nvPicPr>
         <p:blipFill>
-          <a:blip r:embed="rId2">
+          <a:blip r:embed="rId3">
             <a:extLst>
               <a:ext uri="{28A0092B-C50C-407E-A947-70E740481C1C}">
                 <a14:useLocalDpi xmlns:a14="http://schemas.microsoft.com/office/drawing/2010/main" val="0"/>
@@ -10463,7 +12380,7 @@
   <p:timing>
     <p:tnLst>
       <p:par>
-        <p:cTn id="1" dur="indefinite" restart="never" nodeType="tmRoot"/>
+        <p:cTn xmlns:p14="http://schemas.microsoft.com/office/powerpoint/2010/main" id="1" dur="indefinite" restart="never" nodeType="tmRoot"/>
       </p:par>
     </p:tnLst>
   </p:timing>
@@ -10513,7 +12430,7 @@
     </a:clrScheme>
     <a:fontScheme name="Office">
       <a:majorFont>
-        <a:latin typeface="Calibri Light" panose="020F0302020204030204"/>
+        <a:latin typeface="Calibri Light"/>
         <a:ea typeface=""/>
         <a:cs typeface=""/>
         <a:font script="Jpan" typeface="ＭＳ Ｐゴシック"/>
@@ -10548,7 +12465,7 @@
         <a:font script="Geor" typeface="Sylfaen"/>
       </a:majorFont>
       <a:minorFont>
-        <a:latin typeface="Calibri" panose="020F0502020204030204"/>
+        <a:latin typeface="Calibri"/>
         <a:ea typeface=""/>
         <a:cs typeface=""/>
         <a:font script="Jpan" typeface="ＭＳ Ｐゴシック"/>
@@ -10725,7 +12642,7 @@
   <a:extraClrSchemeLst/>
   <a:extLst>
     <a:ext uri="{05A4C25C-085E-4340-85A3-A5531E510DB2}">
-      <thm15:themeFamily xmlns:thm15="http://schemas.microsoft.com/office/thememl/2012/main" name="Office Theme" id="{62F939B6-93AF-4DB8-9C6B-D6C7DFDC589F}" vid="{4A3C46E8-61CC-4603-A589-7422A47A8E4A}"/>
+      <thm15:themeFamily xmlns:thm15="http://schemas.microsoft.com/office/thememl/2012/main" xmlns="" name="Office Theme" id="{62F939B6-93AF-4DB8-9C6B-D6C7DFDC589F}" vid="{4A3C46E8-61CC-4603-A589-7422A47A8E4A}"/>
     </a:ext>
   </a:extLst>
 </a:theme>
@@ -10774,7 +12691,7 @@
     </a:clrScheme>
     <a:fontScheme name="Office">
       <a:majorFont>
-        <a:latin typeface="Calibri Light" panose="020F0302020204030204"/>
+        <a:latin typeface="Calibri Light"/>
         <a:ea typeface=""/>
         <a:cs typeface=""/>
         <a:font script="Jpan" typeface="ＭＳ Ｐゴシック"/>
@@ -10809,7 +12726,7 @@
         <a:font script="Geor" typeface="Sylfaen"/>
       </a:majorFont>
       <a:minorFont>
-        <a:latin typeface="Calibri" panose="020F0502020204030204"/>
+        <a:latin typeface="Calibri"/>
         <a:ea typeface=""/>
         <a:cs typeface=""/>
         <a:font script="Jpan" typeface="ＭＳ Ｐゴシック"/>
@@ -10986,7 +12903,7 @@
   <a:extraClrSchemeLst/>
   <a:extLst>
     <a:ext uri="{05A4C25C-085E-4340-85A3-A5531E510DB2}">
-      <thm15:themeFamily xmlns:thm15="http://schemas.microsoft.com/office/thememl/2012/main" name="Office Theme" id="{62F939B6-93AF-4DB8-9C6B-D6C7DFDC589F}" vid="{4A3C46E8-61CC-4603-A589-7422A47A8E4A}"/>
+      <thm15:themeFamily xmlns:thm15="http://schemas.microsoft.com/office/thememl/2012/main" xmlns="" name="Office Theme" id="{62F939B6-93AF-4DB8-9C6B-D6C7DFDC589F}" vid="{4A3C46E8-61CC-4603-A589-7422A47A8E4A}"/>
     </a:ext>
   </a:extLst>
 </a:theme>

</xml_diff>